<commit_message>
Changes to figures of setup, profiles
condensed the setup vertically. for intensity profiles: changed their tiling in a grid, corrected labels
</commit_message>
<xml_diff>
--- a/figures.pptx
+++ b/figures.pptx
@@ -5,12 +5,11 @@
     <p:sldMasterId id="2147483648" r:id="rId1"/>
   </p:sldMasterIdLst>
   <p:notesMasterIdLst>
-    <p:notesMasterId r:id="rId5"/>
+    <p:notesMasterId r:id="rId4"/>
   </p:notesMasterIdLst>
   <p:sldIdLst>
-    <p:sldId id="258" r:id="rId2"/>
-    <p:sldId id="260" r:id="rId3"/>
-    <p:sldId id="261" r:id="rId4"/>
+    <p:sldId id="260" r:id="rId2"/>
+    <p:sldId id="261" r:id="rId3"/>
   </p:sldIdLst>
   <p:sldSz cx="12192000" cy="6858000"/>
   <p:notesSz cx="7315200" cy="9601200"/>
@@ -133,7 +132,7 @@
           <inkml:channelProperty channel="F" name="resolution" value="0" units="1/dev"/>
         </inkml:channelProperties>
       </inkml:inkSource>
-      <inkml:timestamp xml:id="ts0" timeString="2024-05-04T08:41:02.779"/>
+      <inkml:timestamp xml:id="ts0" timeString="2024-05-20T08:17:22.209"/>
     </inkml:context>
     <inkml:brush xml:id="br0">
       <inkml:brushProperty name="width" value="0.1" units="cm"/>
@@ -141,7 +140,7 @@
       <inkml:brushProperty name="color" value="#FFC114"/>
     </inkml:brush>
   </inkml:definitions>
-  <inkml:trace contextRef="#ctx0" brushRef="#br0">3097 421 616,'-1'0'11842,"-8"4"-11712,-7 15 204,1 0-1,-20 33 1,-17 23-139,19-32-96,21-27-34,0 0 0,-1-1 0,0 0 0,-1-1 0,-28 22-1,28-28-37,-1 0 0,1-1-1,-1-1 1,0 0 0,-1-1-1,0-1 1,1 0-1,-23 1 1,-13-1 30,-67-3 0,55-2 23,-1-2 74,-109-19 0,52 4 106,57 7-5,0-2 0,-116-40 0,165 46-194,0-1-1,0-1 0,0 0 1,1-1-1,0-1 0,1 0 1,-19-20-1,2 3-33,25 23-15,1 0 0,0 0 0,0 0-1,1-1 1,-1 1 0,1-1 0,0 1 0,0-1 0,1 0 0,0-1 0,0 1 0,-2-11 0,2 2-36,1 1 1,0 0 0,0 0 0,4-26 0,-2 37 22,0 0 1,0-1-1,1 1 1,-1 0-1,1 0 1,0-1-1,0 1 1,0 1-1,0-1 1,1 0-1,-1 0 1,1 1-1,-1 0 1,1-1 0,0 1-1,0 0 1,0 0-1,0 1 1,1-1-1,4-1 1,2-2-24,0 2 1,0-1-1,0 1 1,0 1-1,19-3 1,-21 4 4,-1 1 0,1 0 0,0 0 0,-1 0 1,1 1-1,-1 1 0,0-1 0,1 1 0,-1 0 0,9 4 0,-13-4 8,0 0 0,0 0 0,0 0 0,-1 0 0,1 0 0,-1 0 0,1 1 0,-1-1 0,0 1 0,0 0 0,0 0 0,0 0 0,0-1-1,-1 2 1,0-1 0,1 0 0,-1 0 0,0 0 0,0 1 0,-1-1 0,1 0 0,-1 1 0,1-1 0,-2 7 0,2-6 13,-1 0 0,1 0-1,-1 0 1,-1 0 0,1 0 0,0 0 0,-1 0 0,0 0 0,0 0 0,0 0 0,0-1 0,-1 1-1,1 0 1,-1-1 0,0 1 0,0-1 0,-1 0 0,1 1 0,-1-1 0,1 0 0,-1-1-1,0 1 1,0 0 0,0-1 0,-5 4 0,-21 14 4,0-1 0,-1-1-1,0-1 1,-63 24 0,74-34 7,0-1-1,0-1 1,-1-1 0,1-1-1,-1 0 1,0-1 0,0-2-1,0 0 1,1 0-1,-25-5 1,7-6 18,1 0-1,-67-33 1,85 36-40,-29-13 50,-87-53-1,119 64-30,0-2-1,0 1 0,1-2 1,0 0-1,2-1 0,-1 0 1,2 0-1,-19-31 0,-58-97 25,77 130-34,1 1 1,-2 0 0,0 1-1,0 0 1,-1 1 0,0 0 0,0 1-1,-1 0 1,-19-6 0,-12-9 1,32 16 1,-1 1 1,0 1-1,0 0 1,-1 1 0,1 1-1,-1 0 1,-16 0-1,-107 0-21,85 3 8,43 2 9,0-1 1,0 1-1,0 1 1,1 0-1,-15 6 1,10-4 27,-73 22-20,83-26-9,4 0-2,0 0 7,-36 13-513,23-5-42,13-9 537,0 0 0,0 1 1,0-1-1,0 0 0,1 1 1,-1-1-1,0 0 0,0 0 1,0 1-1,0-1 0,0 0 1,1 0-1,-1 0 0,0 1 1,0-1-1,0 0 0,1 0 1,-1 0-1,0 1 1,0-1-1,1 0 0,-1 0 1,0 0-1,0 0 0,1 0 1,-1 0-1,0 0 0,0 0 1,1 0-1,-1 0 0,0 1 1,1-1-1,-1-1 0,0 1 1,0 0-1,1 0 0,-1 0 1,0 0-1,0 0 0,1 0 1,-1 0-1,0 0 0,0 0 1,1 0-1,-1-1 0,21 1-2008,3 0-1672</inkml:trace>
+  <inkml:trace contextRef="#ctx0" brushRef="#br0">2865 65 24575,'-25'3'0,"1"0"0,-1 2 0,1 0 0,0 2 0,-45 19 0,26-10 0,-136 36 0,148-44 0,-11 6 0,2 2 0,-1 1 0,-52 32 0,48-25 0,34-19 0,-1 0 0,1-1 0,-1-1 0,1 1 0,-1-2 0,0 0 0,-18 1 0,-90-5 0,58 0 0,-40 3 0,-79-3 0,155-3 0,1 0 0,-1-1 0,1-2 0,0 0 0,0-2 0,-26-14 0,-51-19 0,40 22 0,-108-55 0,148 64 0,0 1 0,0 1 0,-1 1 0,-44-11 0,59 18 0,1-1 0,0 0 0,0 0 0,0 0 0,1-1 0,-10-5 0,10 4 0,0 1 0,0 1 0,-1-1 0,0 1 0,0 0 0,0 1 0,-10-3 0,-31 0 0,0 2 0,-82 5 0,30 1 0,-318-3-1365,392 0-5461</inkml:trace>
 </inkml:ink>
 </file>
 
@@ -161,73 +160,18 @@
           <inkml:channelProperty channel="F" name="resolution" value="0" units="1/dev"/>
         </inkml:channelProperties>
       </inkml:inkSource>
-      <inkml:timestamp xml:id="ts0" timeString="2024-05-04T08:40:43.050"/>
+      <inkml:timestamp xml:id="ts0" timeString="2024-05-20T08:17:40.833"/>
     </inkml:context>
     <inkml:brush xml:id="br0">
       <inkml:brushProperty name="width" value="0.1" units="cm"/>
       <inkml:brushProperty name="height" value="0.1" units="cm"/>
     </inkml:brush>
   </inkml:definitions>
-  <inkml:trace contextRef="#ctx0" brushRef="#br0">1 202 2905,'0'0'11897,"3"3"-11802,19 0 159,0-1 1,0-1-1,0 0 1,26-4 0,9 1-71,27-2-53,-1-5 0,134-30 0,-122 20-52,235-54-21,-252 60-77,22-6 3,-58 9 30,0 2 1,84-4-1,90 12 142,-94 2 8,-97 0-123,1 0 0,-1 2 0,39 11 0,16 3 28,79 20 170,-90-17-206,-48-14-2,37 9-1,63 6 139,-113-20-162,0 0 0,0 0 0,0 1 0,11 6 0,-11-5 0,0-1 1,1 0-1,14 4 1,-9-3-3,0 0 0,-1 0 0,21 11 0,-19-8 1,-1-1 0,25 6 1,5 6-2,-38-15 6,0 0 0,0 0 0,-1-1-1,1 0 1,1 0 0,-1-1 0,0 1-1,7 0 1,-12-2 40</inkml:trace>
+  <inkml:trace contextRef="#ctx0" brushRef="#br0">2092 1 24575,'-60'3'0,"0"3"0,-76 17 0,53-8 0,-13 5 0,-124 42 0,194-55 0,-1-1 0,0-2 0,-47 2 0,48-5 0,-1 1 0,1 2 0,-44 10 0,44-5 0,0 2 0,0 0 0,1 1 0,-42 29 0,56-35 0,0 0 0,-1 0 0,1-1 0,-1 0 0,0-1 0,0-1 0,0 0 0,-1 0 0,-20 0 0,-13 0 0,-61-6 0,31 0 0,63 2 0,0-1 0,0 0 0,1 0 0,-1-2 0,1 1 0,0-2 0,-14-6 0,-21-7 0,24 13 0,0 1 0,0 0 0,0 2 0,0 0 0,-1 2 0,-34 3 0,20-1 0,-43-3 0,22-12 122,22 4-1609,15 5-5339</inkml:trace>
 </inkml:ink>
 </file>
 
 <file path=ppt/ink/ink3.xml><?xml version="1.0" encoding="utf-8"?>
-<inkml:ink xmlns:inkml="http://www.w3.org/2003/InkML">
-  <inkml:definitions>
-    <inkml:context xml:id="ctx0">
-      <inkml:inkSource xml:id="inkSrc0">
-        <inkml:traceFormat>
-          <inkml:channel name="X" type="integer" min="-2.14748E9" max="2.14748E9" units="cm"/>
-          <inkml:channel name="Y" type="integer" min="-2.14748E9" max="2.14748E9" units="cm"/>
-          <inkml:channel name="F" type="integer" max="32767" units="dev"/>
-        </inkml:traceFormat>
-        <inkml:channelProperties>
-          <inkml:channelProperty channel="X" name="resolution" value="1000" units="1/cm"/>
-          <inkml:channelProperty channel="Y" name="resolution" value="1000" units="1/cm"/>
-          <inkml:channelProperty channel="F" name="resolution" value="0" units="1/dev"/>
-        </inkml:channelProperties>
-      </inkml:inkSource>
-      <inkml:timestamp xml:id="ts0" timeString="2024-05-04T08:41:02.779"/>
-    </inkml:context>
-    <inkml:brush xml:id="br0">
-      <inkml:brushProperty name="width" value="0.1" units="cm"/>
-      <inkml:brushProperty name="height" value="0.1" units="cm"/>
-      <inkml:brushProperty name="color" value="#FFC114"/>
-    </inkml:brush>
-  </inkml:definitions>
-  <inkml:trace contextRef="#ctx0" brushRef="#br0">3097 421 616,'-1'0'11842,"-8"4"-11712,-7 15 204,1 0-1,-20 33 1,-17 23-139,19-32-96,21-27-34,0 0 0,-1-1 0,0 0 0,-1-1 0,-28 22-1,28-28-37,-1 0 0,1-1-1,-1-1 1,0 0 0,-1-1-1,0-1 1,1 0-1,-23 1 1,-13-1 30,-67-3 0,55-2 23,-1-2 74,-109-19 0,52 4 106,57 7-5,0-2 0,-116-40 0,165 46-194,0-1-1,0-1 0,0 0 1,1-1-1,0-1 0,1 0 1,-19-20-1,2 3-33,25 23-15,1 0 0,0 0 0,0 0-1,1-1 1,-1 1 0,1-1 0,0 1 0,0-1 0,1 0 0,0-1 0,0 1 0,-2-11 0,2 2-36,1 1 1,0 0 0,0 0 0,4-26 0,-2 37 22,0 0 1,0-1-1,1 1 1,-1 0-1,1 0 1,0-1-1,0 1 1,0 1-1,0-1 1,1 0-1,-1 0 1,1 1-1,-1 0 1,1-1 0,0 1-1,0 0 1,0 0-1,0 1 1,1-1-1,4-1 1,2-2-24,0 2 1,0-1-1,0 1 1,0 1-1,19-3 1,-21 4 4,-1 1 0,1 0 0,0 0 0,-1 0 1,1 1-1,-1 1 0,0-1 0,1 1 0,-1 0 0,9 4 0,-13-4 8,0 0 0,0 0 0,0 0 0,-1 0 0,1 0 0,-1 0 0,1 1 0,-1-1 0,0 1 0,0 0 0,0 0 0,0 0 0,0-1-1,-1 2 1,0-1 0,1 0 0,-1 0 0,0 0 0,0 1 0,-1-1 0,1 0 0,-1 1 0,1-1 0,-2 7 0,2-6 13,-1 0 0,1 0-1,-1 0 1,-1 0 0,1 0 0,0 0 0,-1 0 0,0 0 0,0 0 0,0 0 0,0-1 0,-1 1-1,1 0 1,-1-1 0,0 1 0,0-1 0,-1 0 0,1 1 0,-1-1 0,1 0 0,-1-1-1,0 1 1,0 0 0,0-1 0,-5 4 0,-21 14 4,0-1 0,-1-1-1,0-1 1,-63 24 0,74-34 7,0-1-1,0-1 1,-1-1 0,1-1-1,-1 0 1,0-1 0,0-2-1,0 0 1,1 0-1,-25-5 1,7-6 18,1 0-1,-67-33 1,85 36-40,-29-13 50,-87-53-1,119 64-30,0-2-1,0 1 0,1-2 1,0 0-1,2-1 0,-1 0 1,2 0-1,-19-31 0,-58-97 25,77 130-34,1 1 1,-2 0 0,0 1-1,0 0 1,-1 1 0,0 0 0,0 1-1,-1 0 1,-19-6 0,-12-9 1,32 16 1,-1 1 1,0 1-1,0 0 1,-1 1 0,1 1-1,-1 0 1,-16 0-1,-107 0-21,85 3 8,43 2 9,0-1 1,0 1-1,0 1 1,1 0-1,-15 6 1,10-4 27,-73 22-20,83-26-9,4 0-2,0 0 7,-36 13-513,23-5-42,13-9 537,0 0 0,0 1 1,0-1-1,0 0 0,1 1 1,-1-1-1,0 0 0,0 0 1,0 1-1,0-1 0,0 0 1,1 0-1,-1 0 0,0 1 1,0-1-1,0 0 0,1 0 1,-1 0-1,0 1 1,0-1-1,1 0 0,-1 0 1,0 0-1,0 0 0,1 0 1,-1 0-1,0 0 0,0 0 1,1 0-1,-1 0 0,0 1 1,1-1-1,-1-1 0,0 1 1,0 0-1,1 0 0,-1 0 1,0 0-1,0 0 0,1 0 1,-1 0-1,0 0 0,0 0 1,1 0-1,-1-1 0,21 1-2008,3 0-1672</inkml:trace>
-</inkml:ink>
-</file>
-
-<file path=ppt/ink/ink4.xml><?xml version="1.0" encoding="utf-8"?>
-<inkml:ink xmlns:inkml="http://www.w3.org/2003/InkML">
-  <inkml:definitions>
-    <inkml:context xml:id="ctx0">
-      <inkml:inkSource xml:id="inkSrc0">
-        <inkml:traceFormat>
-          <inkml:channel name="X" type="integer" min="-2.14748E9" max="2.14748E9" units="cm"/>
-          <inkml:channel name="Y" type="integer" min="-2.14748E9" max="2.14748E9" units="cm"/>
-          <inkml:channel name="F" type="integer" max="32767" units="dev"/>
-        </inkml:traceFormat>
-        <inkml:channelProperties>
-          <inkml:channelProperty channel="X" name="resolution" value="1000" units="1/cm"/>
-          <inkml:channelProperty channel="Y" name="resolution" value="1000" units="1/cm"/>
-          <inkml:channelProperty channel="F" name="resolution" value="0" units="1/dev"/>
-        </inkml:channelProperties>
-      </inkml:inkSource>
-      <inkml:timestamp xml:id="ts0" timeString="2024-05-04T08:40:43.050"/>
-    </inkml:context>
-    <inkml:brush xml:id="br0">
-      <inkml:brushProperty name="width" value="0.1" units="cm"/>
-      <inkml:brushProperty name="height" value="0.1" units="cm"/>
-    </inkml:brush>
-  </inkml:definitions>
-  <inkml:trace contextRef="#ctx0" brushRef="#br0">1 202 2905,'0'0'11897,"3"3"-11802,19 0 159,0-1 1,0-1-1,0 0 1,26-4 0,9 1-71,27-2-53,-1-5 0,134-30 0,-122 20-52,235-54-21,-252 60-77,22-6 3,-58 9 30,0 2 1,84-4-1,90 12 142,-94 2 8,-97 0-123,1 0 0,-1 2 0,39 11 0,16 3 28,79 20 170,-90-17-206,-48-14-2,37 9-1,63 6 139,-113-20-162,0 0 0,0 0 0,0 1 0,11 6 0,-11-5 0,0-1 1,1 0-1,14 4 1,-9-3-3,0 0 0,-1 0 0,21 11 0,-19-8 1,-1-1 0,25 6 1,5 6-2,-38-15 6,0 0 0,0 0 0,-1-1-1,1 0 1,1 0 0,-1-1 0,0 1-1,7 0 1,-12-2 40</inkml:trace>
-</inkml:ink>
-</file>
-
-<file path=ppt/ink/ink5.xml><?xml version="1.0" encoding="utf-8"?>
 <inkml:ink xmlns:inkml="http://www.w3.org/2003/InkML">
   <inkml:definitions>
     <inkml:context xml:id="ctx0">
@@ -255,7 +199,7 @@
 </inkml:ink>
 </file>
 
-<file path=ppt/ink/ink6.xml><?xml version="1.0" encoding="utf-8"?>
+<file path=ppt/ink/ink4.xml><?xml version="1.0" encoding="utf-8"?>
 <inkml:ink xmlns:inkml="http://www.w3.org/2003/InkML">
   <inkml:definitions>
     <inkml:context xml:id="ctx0">
@@ -364,7 +308,7 @@
           <a:p>
             <a:fld id="{A045C956-CD38-486F-B69C-CA4FBFA20EEB}" type="datetimeFigureOut">
               <a:rPr lang="en-PH" smtClean="0"/>
-              <a:t>06/05/2024</a:t>
+              <a:t>20/05/2024</a:t>
             </a:fld>
             <a:endParaRPr lang="en-PH"/>
           </a:p>
@@ -678,7 +622,7 @@
           <a:p>
             <a:r>
               <a:rPr lang="en-PH" dirty="0"/>
-              <a:t>SMF setup. L = spherical lens; PH = pinhole; SLM = spatial light modulator; SMF = single mode fiber; PD = photodetector</a:t>
+              <a:t>Intensity profile setup. BS = beam splitter; M = mirror;</a:t>
             </a:r>
           </a:p>
         </p:txBody>
@@ -709,7 +653,7 @@
     </p:spTree>
     <p:extLst>
       <p:ext uri="{BB962C8B-B14F-4D97-AF65-F5344CB8AC3E}">
-        <p14:creationId xmlns:p14="http://schemas.microsoft.com/office/powerpoint/2010/main" val="3215725071"/>
+        <p14:creationId xmlns:p14="http://schemas.microsoft.com/office/powerpoint/2010/main" val="2323917056"/>
       </p:ext>
     </p:extLst>
   </p:cSld>
@@ -765,7 +709,7 @@
           <a:p>
             <a:r>
               <a:rPr lang="en-PH" dirty="0"/>
-              <a:t>Intensity profile setup. BS = beam splitter; M = mirror;</a:t>
+              <a:t>Intensity profile setup. BP = beam profiler, in place of a camera.</a:t>
             </a:r>
           </a:p>
         </p:txBody>
@@ -788,93 +732,6 @@
             <a:fld id="{2520E29C-53EB-4164-8CBD-C21E0C0469C9}" type="slidenum">
               <a:rPr lang="en-PH" smtClean="0"/>
               <a:t>2</a:t>
-            </a:fld>
-            <a:endParaRPr lang="en-PH"/>
-          </a:p>
-        </p:txBody>
-      </p:sp>
-    </p:spTree>
-    <p:extLst>
-      <p:ext uri="{BB962C8B-B14F-4D97-AF65-F5344CB8AC3E}">
-        <p14:creationId xmlns:p14="http://schemas.microsoft.com/office/powerpoint/2010/main" val="2323917056"/>
-      </p:ext>
-    </p:extLst>
-  </p:cSld>
-  <p:clrMapOvr>
-    <a:masterClrMapping/>
-  </p:clrMapOvr>
-</p:notes>
-</file>
-
-<file path=ppt/notesSlides/notesSlide3.xml><?xml version="1.0" encoding="utf-8"?>
-<p:notes xmlns:a="http://schemas.openxmlformats.org/drawingml/2006/main" xmlns:r="http://schemas.openxmlformats.org/officeDocument/2006/relationships" xmlns:p="http://schemas.openxmlformats.org/presentationml/2006/main">
-  <p:cSld>
-    <p:spTree>
-      <p:nvGrpSpPr>
-        <p:cNvPr id="1" name=""/>
-        <p:cNvGrpSpPr/>
-        <p:nvPr/>
-      </p:nvGrpSpPr>
-      <p:grpSpPr>
-        <a:xfrm>
-          <a:off x="0" y="0"/>
-          <a:ext cx="0" cy="0"/>
-          <a:chOff x="0" y="0"/>
-          <a:chExt cx="0" cy="0"/>
-        </a:xfrm>
-      </p:grpSpPr>
-      <p:sp>
-        <p:nvSpPr>
-          <p:cNvPr id="2" name="Slide Image Placeholder 1"/>
-          <p:cNvSpPr>
-            <a:spLocks noGrp="1" noRot="1" noChangeAspect="1"/>
-          </p:cNvSpPr>
-          <p:nvPr>
-            <p:ph type="sldImg"/>
-          </p:nvPr>
-        </p:nvSpPr>
-        <p:spPr/>
-      </p:sp>
-      <p:sp>
-        <p:nvSpPr>
-          <p:cNvPr id="3" name="Notes Placeholder 2"/>
-          <p:cNvSpPr>
-            <a:spLocks noGrp="1"/>
-          </p:cNvSpPr>
-          <p:nvPr>
-            <p:ph type="body" idx="1"/>
-          </p:nvPr>
-        </p:nvSpPr>
-        <p:spPr/>
-        <p:txBody>
-          <a:bodyPr/>
-          <a:lstStyle/>
-          <a:p>
-            <a:r>
-              <a:rPr lang="en-PH" dirty="0"/>
-              <a:t>Intensity profile setup. BP = beam profiler, in place of a camera.</a:t>
-            </a:r>
-          </a:p>
-        </p:txBody>
-      </p:sp>
-      <p:sp>
-        <p:nvSpPr>
-          <p:cNvPr id="4" name="Slide Number Placeholder 3"/>
-          <p:cNvSpPr>
-            <a:spLocks noGrp="1"/>
-          </p:cNvSpPr>
-          <p:nvPr>
-            <p:ph type="sldNum" sz="quarter" idx="5"/>
-          </p:nvPr>
-        </p:nvSpPr>
-        <p:spPr/>
-        <p:txBody>
-          <a:bodyPr/>
-          <a:lstStyle/>
-          <a:p>
-            <a:fld id="{2520E29C-53EB-4164-8CBD-C21E0C0469C9}" type="slidenum">
-              <a:rPr lang="en-PH" smtClean="0"/>
-              <a:t>3</a:t>
             </a:fld>
             <a:endParaRPr lang="en-PH"/>
           </a:p>
@@ -1042,7 +899,7 @@
           <a:p>
             <a:fld id="{5BBB2114-AE40-45E0-8CC1-48D36C3BD52B}" type="datetimeFigureOut">
               <a:rPr lang="en-PH" smtClean="0"/>
-              <a:t>06/05/2024</a:t>
+              <a:t>20/05/2024</a:t>
             </a:fld>
             <a:endParaRPr lang="en-PH"/>
           </a:p>
@@ -1242,7 +1099,7 @@
           <a:p>
             <a:fld id="{5BBB2114-AE40-45E0-8CC1-48D36C3BD52B}" type="datetimeFigureOut">
               <a:rPr lang="en-PH" smtClean="0"/>
-              <a:t>06/05/2024</a:t>
+              <a:t>20/05/2024</a:t>
             </a:fld>
             <a:endParaRPr lang="en-PH"/>
           </a:p>
@@ -1452,7 +1309,7 @@
           <a:p>
             <a:fld id="{5BBB2114-AE40-45E0-8CC1-48D36C3BD52B}" type="datetimeFigureOut">
               <a:rPr lang="en-PH" smtClean="0"/>
-              <a:t>06/05/2024</a:t>
+              <a:t>20/05/2024</a:t>
             </a:fld>
             <a:endParaRPr lang="en-PH"/>
           </a:p>
@@ -1652,7 +1509,7 @@
           <a:p>
             <a:fld id="{5BBB2114-AE40-45E0-8CC1-48D36C3BD52B}" type="datetimeFigureOut">
               <a:rPr lang="en-PH" smtClean="0"/>
-              <a:t>06/05/2024</a:t>
+              <a:t>20/05/2024</a:t>
             </a:fld>
             <a:endParaRPr lang="en-PH"/>
           </a:p>
@@ -1928,7 +1785,7 @@
           <a:p>
             <a:fld id="{5BBB2114-AE40-45E0-8CC1-48D36C3BD52B}" type="datetimeFigureOut">
               <a:rPr lang="en-PH" smtClean="0"/>
-              <a:t>06/05/2024</a:t>
+              <a:t>20/05/2024</a:t>
             </a:fld>
             <a:endParaRPr lang="en-PH"/>
           </a:p>
@@ -2196,7 +2053,7 @@
           <a:p>
             <a:fld id="{5BBB2114-AE40-45E0-8CC1-48D36C3BD52B}" type="datetimeFigureOut">
               <a:rPr lang="en-PH" smtClean="0"/>
-              <a:t>06/05/2024</a:t>
+              <a:t>20/05/2024</a:t>
             </a:fld>
             <a:endParaRPr lang="en-PH"/>
           </a:p>
@@ -2611,7 +2468,7 @@
           <a:p>
             <a:fld id="{5BBB2114-AE40-45E0-8CC1-48D36C3BD52B}" type="datetimeFigureOut">
               <a:rPr lang="en-PH" smtClean="0"/>
-              <a:t>06/05/2024</a:t>
+              <a:t>20/05/2024</a:t>
             </a:fld>
             <a:endParaRPr lang="en-PH"/>
           </a:p>
@@ -2753,7 +2610,7 @@
           <a:p>
             <a:fld id="{5BBB2114-AE40-45E0-8CC1-48D36C3BD52B}" type="datetimeFigureOut">
               <a:rPr lang="en-PH" smtClean="0"/>
-              <a:t>06/05/2024</a:t>
+              <a:t>20/05/2024</a:t>
             </a:fld>
             <a:endParaRPr lang="en-PH"/>
           </a:p>
@@ -2866,7 +2723,7 @@
           <a:p>
             <a:fld id="{5BBB2114-AE40-45E0-8CC1-48D36C3BD52B}" type="datetimeFigureOut">
               <a:rPr lang="en-PH" smtClean="0"/>
-              <a:t>06/05/2024</a:t>
+              <a:t>20/05/2024</a:t>
             </a:fld>
             <a:endParaRPr lang="en-PH"/>
           </a:p>
@@ -3179,7 +3036,7 @@
           <a:p>
             <a:fld id="{5BBB2114-AE40-45E0-8CC1-48D36C3BD52B}" type="datetimeFigureOut">
               <a:rPr lang="en-PH" smtClean="0"/>
-              <a:t>06/05/2024</a:t>
+              <a:t>20/05/2024</a:t>
             </a:fld>
             <a:endParaRPr lang="en-PH"/>
           </a:p>
@@ -3468,7 +3325,7 @@
           <a:p>
             <a:fld id="{5BBB2114-AE40-45E0-8CC1-48D36C3BD52B}" type="datetimeFigureOut">
               <a:rPr lang="en-PH" smtClean="0"/>
-              <a:t>06/05/2024</a:t>
+              <a:t>20/05/2024</a:t>
             </a:fld>
             <a:endParaRPr lang="en-PH"/>
           </a:p>
@@ -3711,7 +3568,7 @@
           <a:p>
             <a:fld id="{5BBB2114-AE40-45E0-8CC1-48D36C3BD52B}" type="datetimeFigureOut">
               <a:rPr lang="en-PH" smtClean="0"/>
-              <a:t>06/05/2024</a:t>
+              <a:t>20/05/2024</a:t>
             </a:fld>
             <a:endParaRPr lang="en-PH"/>
           </a:p>
@@ -4130,10 +3987,10 @@
       </p:grpSpPr>
       <p:grpSp>
         <p:nvGrpSpPr>
-          <p:cNvPr id="3" name="Group 2">
-            <a:extLst>
-              <a:ext uri="{FF2B5EF4-FFF2-40B4-BE49-F238E27FC236}">
-                <a16:creationId xmlns:a16="http://schemas.microsoft.com/office/drawing/2014/main" id="{1F24006A-2AFC-E660-5C29-35969D4E8442}"/>
+          <p:cNvPr id="55" name="Group 54">
+            <a:extLst>
+              <a:ext uri="{FF2B5EF4-FFF2-40B4-BE49-F238E27FC236}">
+                <a16:creationId xmlns:a16="http://schemas.microsoft.com/office/drawing/2014/main" id="{B1D20652-1893-E702-43D1-E185309DBA9A}"/>
               </a:ext>
             </a:extLst>
           </p:cNvPr>
@@ -4142,20 +3999,20 @@
         </p:nvGrpSpPr>
         <p:grpSpPr>
           <a:xfrm>
-            <a:off x="3019463" y="388330"/>
-            <a:ext cx="6153073" cy="6081339"/>
-            <a:chOff x="1684809" y="295576"/>
-            <a:chExt cx="6153073" cy="6081339"/>
+            <a:off x="1257051" y="388330"/>
+            <a:ext cx="8554481" cy="4310990"/>
+            <a:chOff x="1257051" y="388330"/>
+            <a:chExt cx="8554481" cy="4310990"/>
           </a:xfrm>
         </p:grpSpPr>
         <mc:AlternateContent xmlns:mc="http://schemas.openxmlformats.org/markup-compatibility/2006">
           <mc:Choice xmlns:p14="http://schemas.microsoft.com/office/powerpoint/2010/main" Requires="p14">
             <p:contentPart p14:bwMode="auto" r:id="rId3">
               <p14:nvContentPartPr>
-                <p14:cNvPr id="208" name="Ink 207">
+                <p14:cNvPr id="49" name="Ink 48">
                   <a:extLst>
                     <a:ext uri="{FF2B5EF4-FFF2-40B4-BE49-F238E27FC236}">
-                      <a16:creationId xmlns:a16="http://schemas.microsoft.com/office/drawing/2014/main" id="{A5995E24-964D-C220-2940-F4E75720C59F}"/>
+                      <a16:creationId xmlns:a16="http://schemas.microsoft.com/office/drawing/2014/main" id="{2E3CBEFB-FC64-1D14-EF69-9F3B11A078E0}"/>
                     </a:ext>
                   </a:extLst>
                 </p14:cNvPr>
@@ -4163,18 +4020,18 @@
                 <p14:nvPr/>
               </p14:nvContentPartPr>
               <p14:xfrm>
-                <a:off x="4033753" y="5777049"/>
-                <a:ext cx="1114920" cy="289080"/>
+                <a:off x="3454306" y="4139831"/>
+                <a:ext cx="1031760" cy="121680"/>
               </p14:xfrm>
             </p:contentPart>
           </mc:Choice>
           <mc:Fallback>
             <p:pic>
               <p:nvPicPr>
-                <p:cNvPr id="208" name="Ink 207">
+                <p:cNvPr id="49" name="Ink 48">
                   <a:extLst>
                     <a:ext uri="{FF2B5EF4-FFF2-40B4-BE49-F238E27FC236}">
-                      <a16:creationId xmlns:a16="http://schemas.microsoft.com/office/drawing/2014/main" id="{A5995E24-964D-C220-2940-F4E75720C59F}"/>
+                      <a16:creationId xmlns:a16="http://schemas.microsoft.com/office/drawing/2014/main" id="{2E3CBEFB-FC64-1D14-EF69-9F3B11A078E0}"/>
                     </a:ext>
                   </a:extLst>
                 </p:cNvPr>
@@ -4189,8 +4046,8 @@
               </p:blipFill>
               <p:spPr>
                 <a:xfrm>
-                  <a:off x="4015759" y="5759049"/>
-                  <a:ext cx="1150548" cy="324720"/>
+                  <a:off x="3436306" y="4122191"/>
+                  <a:ext cx="1067400" cy="157320"/>
                 </a:xfrm>
                 <a:prstGeom prst="rect">
                   <a:avLst/>
@@ -4199,62 +4056,6 @@
             </p:pic>
           </mc:Fallback>
         </mc:AlternateContent>
-        <p:sp>
-          <p:nvSpPr>
-            <p:cNvPr id="128" name="Isosceles Triangle 127">
-              <a:extLst>
-                <a:ext uri="{FF2B5EF4-FFF2-40B4-BE49-F238E27FC236}">
-                  <a16:creationId xmlns:a16="http://schemas.microsoft.com/office/drawing/2014/main" id="{05059425-EC43-595A-30A8-587D70B04E91}"/>
-                </a:ext>
-              </a:extLst>
-            </p:cNvPr>
-            <p:cNvSpPr/>
-            <p:nvPr/>
-          </p:nvSpPr>
-          <p:spPr>
-            <a:xfrm rot="12676046">
-              <a:off x="5707131" y="4944701"/>
-              <a:ext cx="89810" cy="161689"/>
-            </a:xfrm>
-            <a:prstGeom prst="triangle">
-              <a:avLst>
-                <a:gd name="adj" fmla="val 51244"/>
-              </a:avLst>
-            </a:prstGeom>
-            <a:solidFill>
-              <a:srgbClr val="FF0000"/>
-            </a:solidFill>
-            <a:ln>
-              <a:solidFill>
-                <a:srgbClr val="FF0000"/>
-              </a:solidFill>
-            </a:ln>
-          </p:spPr>
-          <p:style>
-            <a:lnRef idx="2">
-              <a:schemeClr val="accent1">
-                <a:shade val="15000"/>
-              </a:schemeClr>
-            </a:lnRef>
-            <a:fillRef idx="1">
-              <a:schemeClr val="accent1"/>
-            </a:fillRef>
-            <a:effectRef idx="0">
-              <a:schemeClr val="accent1"/>
-            </a:effectRef>
-            <a:fontRef idx="minor">
-              <a:schemeClr val="lt1"/>
-            </a:fontRef>
-          </p:style>
-          <p:txBody>
-            <a:bodyPr rtlCol="0" anchor="ctr"/>
-            <a:lstStyle/>
-            <a:p>
-              <a:pPr algn="ctr"/>
-              <a:endParaRPr lang="en-PH"/>
-            </a:p>
-          </p:txBody>
-        </p:sp>
         <p:sp>
           <p:nvSpPr>
             <p:cNvPr id="124" name="Isosceles Triangle 123">
@@ -4269,7 +4070,7 @@
           </p:nvSpPr>
           <p:spPr>
             <a:xfrm rot="5400000">
-              <a:off x="3966981" y="2125193"/>
+              <a:off x="5301635" y="2217947"/>
               <a:ext cx="89810" cy="161689"/>
             </a:xfrm>
             <a:prstGeom prst="triangle">
@@ -4325,7 +4126,7 @@
           </p:nvSpPr>
           <p:spPr>
             <a:xfrm rot="16200000">
-              <a:off x="4290470" y="1947973"/>
+              <a:off x="5625124" y="2044537"/>
               <a:ext cx="216777" cy="516128"/>
             </a:xfrm>
             <a:prstGeom prst="triangle">
@@ -4384,7 +4185,7 @@
           </p:nvCxnSpPr>
           <p:spPr>
             <a:xfrm flipV="1">
-              <a:off x="7058209" y="2230742"/>
+              <a:off x="8392863" y="2323496"/>
               <a:ext cx="333798" cy="999835"/>
             </a:xfrm>
             <a:prstGeom prst="line">
@@ -4431,7 +4232,7 @@
           </p:nvCxnSpPr>
           <p:spPr>
             <a:xfrm flipH="1">
-              <a:off x="7225108" y="2230742"/>
+              <a:off x="8559762" y="2323496"/>
               <a:ext cx="166899" cy="1103404"/>
             </a:xfrm>
             <a:prstGeom prst="line">
@@ -4472,15 +4273,14 @@
             </p:cNvPr>
             <p:cNvCxnSpPr>
               <a:cxnSpLocks/>
-              <a:stCxn id="52" idx="6"/>
               <a:endCxn id="11" idx="2"/>
             </p:cNvCxnSpPr>
             <p:nvPr/>
           </p:nvCxnSpPr>
           <p:spPr>
             <a:xfrm flipV="1">
-              <a:off x="5966241" y="2230742"/>
-              <a:ext cx="1425766" cy="2421379"/>
+              <a:off x="7671792" y="2323496"/>
+              <a:ext cx="1054869" cy="1854557"/>
             </a:xfrm>
             <a:prstGeom prst="line">
               <a:avLst/>
@@ -4524,7 +4324,7 @@
           </p:nvCxnSpPr>
           <p:spPr>
             <a:xfrm flipH="1" flipV="1">
-              <a:off x="2169216" y="775856"/>
+              <a:off x="3503870" y="868610"/>
               <a:ext cx="1496834" cy="19229"/>
             </a:xfrm>
             <a:prstGeom prst="line">
@@ -4565,7 +4365,7 @@
           </p:nvSpPr>
           <p:spPr>
             <a:xfrm>
-              <a:off x="4954826" y="2070336"/>
+              <a:off x="6289480" y="2163090"/>
               <a:ext cx="2543935" cy="275345"/>
             </a:xfrm>
             <a:prstGeom prst="rect">
@@ -4619,7 +4419,7 @@
           </p:nvSpPr>
           <p:spPr>
             <a:xfrm>
-              <a:off x="3571101" y="1760857"/>
+              <a:off x="4905755" y="1853611"/>
               <a:ext cx="370515" cy="881269"/>
             </a:xfrm>
             <a:prstGeom prst="ellipse">
@@ -4683,7 +4483,7 @@
           </p:nvSpPr>
           <p:spPr>
             <a:xfrm>
-              <a:off x="4663069" y="1755744"/>
+              <a:off x="5997723" y="1848498"/>
               <a:ext cx="370515" cy="881269"/>
             </a:xfrm>
             <a:prstGeom prst="ellipse">
@@ -4747,7 +4547,7 @@
           </p:nvSpPr>
           <p:spPr>
             <a:xfrm>
-              <a:off x="3666050" y="596428"/>
+              <a:off x="5000704" y="689182"/>
               <a:ext cx="1331800" cy="397313"/>
             </a:xfrm>
             <a:prstGeom prst="rect">
@@ -4799,7 +4599,7 @@
           </p:nvSpPr>
           <p:spPr>
             <a:xfrm rot="3025603">
-              <a:off x="7123653" y="1818543"/>
+              <a:off x="8458307" y="1911297"/>
               <a:ext cx="924876" cy="503583"/>
             </a:xfrm>
             <a:prstGeom prst="rect">
@@ -4850,7 +4650,46 @@
           </p:nvCxnSpPr>
           <p:spPr>
             <a:xfrm>
-              <a:off x="6909751" y="3141088"/>
+              <a:off x="8244405" y="3233842"/>
+              <a:ext cx="315357" cy="193058"/>
+            </a:xfrm>
+            <a:prstGeom prst="line">
+              <a:avLst/>
+            </a:prstGeom>
+            <a:ln w="76200"/>
+          </p:spPr>
+          <p:style>
+            <a:lnRef idx="2">
+              <a:schemeClr val="dk1"/>
+            </a:lnRef>
+            <a:fillRef idx="0">
+              <a:schemeClr val="dk1"/>
+            </a:fillRef>
+            <a:effectRef idx="1">
+              <a:schemeClr val="dk1"/>
+            </a:effectRef>
+            <a:fontRef idx="minor">
+              <a:schemeClr val="tx1"/>
+            </a:fontRef>
+          </p:style>
+        </p:cxnSp>
+        <p:cxnSp>
+          <p:nvCxnSpPr>
+            <p:cNvPr id="184" name="Straight Connector 183">
+              <a:extLst>
+                <a:ext uri="{FF2B5EF4-FFF2-40B4-BE49-F238E27FC236}">
+                  <a16:creationId xmlns:a16="http://schemas.microsoft.com/office/drawing/2014/main" id="{5734ABC8-7EDD-6793-7120-D678824DB3F8}"/>
+                </a:ext>
+              </a:extLst>
+            </p:cNvPr>
+            <p:cNvCxnSpPr>
+              <a:cxnSpLocks/>
+            </p:cNvCxnSpPr>
+            <p:nvPr/>
+          </p:nvCxnSpPr>
+          <p:spPr>
+            <a:xfrm>
+              <a:off x="7837787" y="2993288"/>
               <a:ext cx="315357" cy="193058"/>
             </a:xfrm>
             <a:prstGeom prst="line">
@@ -4875,511 +4714,6 @@
         </p:cxnSp>
         <p:sp>
           <p:nvSpPr>
-            <p:cNvPr id="52" name="Oval 51">
-              <a:extLst>
-                <a:ext uri="{FF2B5EF4-FFF2-40B4-BE49-F238E27FC236}">
-                  <a16:creationId xmlns:a16="http://schemas.microsoft.com/office/drawing/2014/main" id="{E624AD67-72E5-4CF3-C3D3-C0C3530DCE36}"/>
-                </a:ext>
-              </a:extLst>
-            </p:cNvPr>
-            <p:cNvSpPr/>
-            <p:nvPr/>
-          </p:nvSpPr>
-          <p:spPr>
-            <a:xfrm rot="18294376">
-              <a:off x="5693716" y="4389910"/>
-              <a:ext cx="346671" cy="808723"/>
-            </a:xfrm>
-            <a:prstGeom prst="ellipse">
-              <a:avLst/>
-            </a:prstGeom>
-            <a:solidFill>
-              <a:schemeClr val="accent1">
-                <a:lumMod val="40000"/>
-                <a:lumOff val="60000"/>
-              </a:schemeClr>
-            </a:solidFill>
-            <a:ln>
-              <a:solidFill>
-                <a:schemeClr val="accent1">
-                  <a:lumMod val="40000"/>
-                  <a:lumOff val="60000"/>
-                </a:schemeClr>
-              </a:solidFill>
-            </a:ln>
-          </p:spPr>
-          <p:style>
-            <a:lnRef idx="2">
-              <a:schemeClr val="accent1">
-                <a:shade val="15000"/>
-              </a:schemeClr>
-            </a:lnRef>
-            <a:fillRef idx="1">
-              <a:schemeClr val="accent1"/>
-            </a:fillRef>
-            <a:effectRef idx="0">
-              <a:schemeClr val="accent1"/>
-            </a:effectRef>
-            <a:fontRef idx="minor">
-              <a:schemeClr val="lt1"/>
-            </a:fontRef>
-          </p:style>
-          <p:txBody>
-            <a:bodyPr rtlCol="0" anchor="ctr"/>
-            <a:lstStyle/>
-            <a:p>
-              <a:pPr algn="ctr"/>
-              <a:r>
-                <a:rPr lang="en-US" dirty="0"/>
-                <a:t>L</a:t>
-              </a:r>
-              <a:endParaRPr lang="en-PH" dirty="0"/>
-            </a:p>
-          </p:txBody>
-        </p:sp>
-        <p:sp>
-          <p:nvSpPr>
-            <p:cNvPr id="57" name="Oval 56">
-              <a:extLst>
-                <a:ext uri="{FF2B5EF4-FFF2-40B4-BE49-F238E27FC236}">
-                  <a16:creationId xmlns:a16="http://schemas.microsoft.com/office/drawing/2014/main" id="{30FE1409-7865-8710-384F-5B9D104D10C7}"/>
-                </a:ext>
-              </a:extLst>
-            </p:cNvPr>
-            <p:cNvSpPr/>
-            <p:nvPr/>
-          </p:nvSpPr>
-          <p:spPr>
-            <a:xfrm rot="18533770">
-              <a:off x="5116557" y="5834365"/>
-              <a:ext cx="64233" cy="157859"/>
-            </a:xfrm>
-            <a:prstGeom prst="ellipse">
-              <a:avLst/>
-            </a:prstGeom>
-            <a:solidFill>
-              <a:schemeClr val="tx1"/>
-            </a:solidFill>
-            <a:ln>
-              <a:solidFill>
-                <a:schemeClr val="tx1"/>
-              </a:solidFill>
-            </a:ln>
-          </p:spPr>
-          <p:style>
-            <a:lnRef idx="2">
-              <a:schemeClr val="accent1">
-                <a:shade val="15000"/>
-              </a:schemeClr>
-            </a:lnRef>
-            <a:fillRef idx="1">
-              <a:schemeClr val="accent1"/>
-            </a:fillRef>
-            <a:effectRef idx="0">
-              <a:schemeClr val="accent1"/>
-            </a:effectRef>
-            <a:fontRef idx="minor">
-              <a:schemeClr val="lt1"/>
-            </a:fontRef>
-          </p:style>
-          <p:txBody>
-            <a:bodyPr rtlCol="0" anchor="ctr"/>
-            <a:lstStyle/>
-            <a:p>
-              <a:pPr algn="ctr"/>
-              <a:endParaRPr lang="en-PH"/>
-            </a:p>
-          </p:txBody>
-        </p:sp>
-        <p:cxnSp>
-          <p:nvCxnSpPr>
-            <p:cNvPr id="184" name="Straight Connector 183">
-              <a:extLst>
-                <a:ext uri="{FF2B5EF4-FFF2-40B4-BE49-F238E27FC236}">
-                  <a16:creationId xmlns:a16="http://schemas.microsoft.com/office/drawing/2014/main" id="{5734ABC8-7EDD-6793-7120-D678824DB3F8}"/>
-                </a:ext>
-              </a:extLst>
-            </p:cNvPr>
-            <p:cNvCxnSpPr>
-              <a:cxnSpLocks/>
-            </p:cNvCxnSpPr>
-            <p:nvPr/>
-          </p:nvCxnSpPr>
-          <p:spPr>
-            <a:xfrm>
-              <a:off x="6503133" y="2900534"/>
-              <a:ext cx="315357" cy="193058"/>
-            </a:xfrm>
-            <a:prstGeom prst="line">
-              <a:avLst/>
-            </a:prstGeom>
-            <a:ln w="76200"/>
-          </p:spPr>
-          <p:style>
-            <a:lnRef idx="2">
-              <a:schemeClr val="dk1"/>
-            </a:lnRef>
-            <a:fillRef idx="0">
-              <a:schemeClr val="dk1"/>
-            </a:fillRef>
-            <a:effectRef idx="1">
-              <a:schemeClr val="dk1"/>
-            </a:effectRef>
-            <a:fontRef idx="minor">
-              <a:schemeClr val="tx1"/>
-            </a:fontRef>
-          </p:style>
-        </p:cxnSp>
-        <p:sp>
-          <p:nvSpPr>
-            <p:cNvPr id="187" name="Isosceles Triangle 186">
-              <a:extLst>
-                <a:ext uri="{FF2B5EF4-FFF2-40B4-BE49-F238E27FC236}">
-                  <a16:creationId xmlns:a16="http://schemas.microsoft.com/office/drawing/2014/main" id="{F37BE952-7016-E701-0E42-19E76E9EA606}"/>
-                </a:ext>
-              </a:extLst>
-            </p:cNvPr>
-            <p:cNvSpPr/>
-            <p:nvPr/>
-          </p:nvSpPr>
-          <p:spPr>
-            <a:xfrm rot="1983322">
-              <a:off x="5589705" y="5124332"/>
-              <a:ext cx="89810" cy="161689"/>
-            </a:xfrm>
-            <a:prstGeom prst="triangle">
-              <a:avLst>
-                <a:gd name="adj" fmla="val 51244"/>
-              </a:avLst>
-            </a:prstGeom>
-            <a:solidFill>
-              <a:srgbClr val="FF0000"/>
-            </a:solidFill>
-            <a:ln>
-              <a:solidFill>
-                <a:srgbClr val="FF0000"/>
-              </a:solidFill>
-            </a:ln>
-          </p:spPr>
-          <p:style>
-            <a:lnRef idx="2">
-              <a:schemeClr val="accent1">
-                <a:shade val="15000"/>
-              </a:schemeClr>
-            </a:lnRef>
-            <a:fillRef idx="1">
-              <a:schemeClr val="accent1"/>
-            </a:fillRef>
-            <a:effectRef idx="0">
-              <a:schemeClr val="accent1"/>
-            </a:effectRef>
-            <a:fontRef idx="minor">
-              <a:schemeClr val="lt1"/>
-            </a:fontRef>
-          </p:style>
-          <p:txBody>
-            <a:bodyPr rtlCol="0" anchor="ctr"/>
-            <a:lstStyle/>
-            <a:p>
-              <a:pPr algn="ctr"/>
-              <a:endParaRPr lang="en-PH"/>
-            </a:p>
-          </p:txBody>
-        </p:sp>
-        <p:cxnSp>
-          <p:nvCxnSpPr>
-            <p:cNvPr id="188" name="Straight Connector 187">
-              <a:extLst>
-                <a:ext uri="{FF2B5EF4-FFF2-40B4-BE49-F238E27FC236}">
-                  <a16:creationId xmlns:a16="http://schemas.microsoft.com/office/drawing/2014/main" id="{6623DFD0-1EF2-EE0B-4820-667E2CB1D2A4}"/>
-                </a:ext>
-              </a:extLst>
-            </p:cNvPr>
-            <p:cNvCxnSpPr>
-              <a:cxnSpLocks/>
-              <a:stCxn id="57" idx="6"/>
-              <a:endCxn id="51" idx="2"/>
-            </p:cNvCxnSpPr>
-            <p:nvPr/>
-          </p:nvCxnSpPr>
-          <p:spPr>
-            <a:xfrm flipV="1">
-              <a:off x="5168840" y="5556078"/>
-              <a:ext cx="230581" cy="332221"/>
-            </a:xfrm>
-            <a:prstGeom prst="line">
-              <a:avLst/>
-            </a:prstGeom>
-            <a:ln w="57150">
-              <a:solidFill>
-                <a:srgbClr val="FF0000"/>
-              </a:solidFill>
-            </a:ln>
-          </p:spPr>
-          <p:style>
-            <a:lnRef idx="2">
-              <a:schemeClr val="accent1"/>
-            </a:lnRef>
-            <a:fillRef idx="0">
-              <a:schemeClr val="accent1"/>
-            </a:fillRef>
-            <a:effectRef idx="1">
-              <a:schemeClr val="accent1"/>
-            </a:effectRef>
-            <a:fontRef idx="minor">
-              <a:schemeClr val="tx1"/>
-            </a:fontRef>
-          </p:style>
-        </p:cxnSp>
-        <p:pic>
-          <p:nvPicPr>
-            <p:cNvPr id="211" name="Picture 210" descr="A screen with a graph on it&#10;&#10;Description automatically generated">
-              <a:extLst>
-                <a:ext uri="{FF2B5EF4-FFF2-40B4-BE49-F238E27FC236}">
-                  <a16:creationId xmlns:a16="http://schemas.microsoft.com/office/drawing/2014/main" id="{D56096F2-7DBC-CFA4-F5E1-1DC73879E417}"/>
-                </a:ext>
-              </a:extLst>
-            </p:cNvPr>
-            <p:cNvPicPr>
-              <a:picLocks noChangeAspect="1"/>
-            </p:cNvPicPr>
-            <p:nvPr/>
-          </p:nvPicPr>
-          <p:blipFill>
-            <a:blip r:embed="rId5">
-              <a:extLst>
-                <a:ext uri="{28A0092B-C50C-407E-A947-70E740481C1C}">
-                  <a14:useLocalDpi xmlns:a14="http://schemas.microsoft.com/office/drawing/2010/main" val="0"/>
-                </a:ext>
-                <a:ext uri="{837473B0-CC2E-450A-ABE3-18F120FF3D39}">
-                  <a1611:picAttrSrcUrl xmlns:a1611="http://schemas.microsoft.com/office/drawing/2016/11/main" r:id="rId6"/>
-                </a:ext>
-              </a:extLst>
-            </a:blip>
-            <a:stretch>
-              <a:fillRect/>
-            </a:stretch>
-          </p:blipFill>
-          <p:spPr>
-            <a:xfrm>
-              <a:off x="1912189" y="5369551"/>
-              <a:ext cx="1033491" cy="546889"/>
-            </a:xfrm>
-            <a:prstGeom prst="rect">
-              <a:avLst/>
-            </a:prstGeom>
-          </p:spPr>
-        </p:pic>
-        <mc:AlternateContent xmlns:mc="http://schemas.openxmlformats.org/markup-compatibility/2006">
-          <mc:Choice xmlns:p14="http://schemas.microsoft.com/office/powerpoint/2010/main" Requires="p14">
-            <p:contentPart p14:bwMode="auto" r:id="rId7">
-              <p14:nvContentPartPr>
-                <p14:cNvPr id="205" name="Ink 204">
-                  <a:extLst>
-                    <a:ext uri="{FF2B5EF4-FFF2-40B4-BE49-F238E27FC236}">
-                      <a16:creationId xmlns:a16="http://schemas.microsoft.com/office/drawing/2014/main" id="{498CB499-20C6-0E57-15BA-6B02BD309A41}"/>
-                    </a:ext>
-                  </a:extLst>
-                </p14:cNvPr>
-                <p14:cNvContentPartPr/>
-                <p14:nvPr/>
-              </p14:nvContentPartPr>
-              <p14:xfrm>
-                <a:off x="2821018" y="5697431"/>
-                <a:ext cx="982080" cy="98280"/>
-              </p14:xfrm>
-            </p:contentPart>
-          </mc:Choice>
-          <mc:Fallback>
-            <p:pic>
-              <p:nvPicPr>
-                <p:cNvPr id="205" name="Ink 204">
-                  <a:extLst>
-                    <a:ext uri="{FF2B5EF4-FFF2-40B4-BE49-F238E27FC236}">
-                      <a16:creationId xmlns:a16="http://schemas.microsoft.com/office/drawing/2014/main" id="{498CB499-20C6-0E57-15BA-6B02BD309A41}"/>
-                    </a:ext>
-                  </a:extLst>
-                </p:cNvPr>
-                <p:cNvPicPr/>
-                <p:nvPr/>
-              </p:nvPicPr>
-              <p:blipFill>
-                <a:blip r:embed="rId8"/>
-                <a:stretch>
-                  <a:fillRect/>
-                </a:stretch>
-              </p:blipFill>
-              <p:spPr>
-                <a:xfrm>
-                  <a:off x="2803018" y="5679431"/>
-                  <a:ext cx="1017720" cy="133920"/>
-                </a:xfrm>
-                <a:prstGeom prst="rect">
-                  <a:avLst/>
-                </a:prstGeom>
-              </p:spPr>
-            </p:pic>
-          </mc:Fallback>
-        </mc:AlternateContent>
-        <p:sp>
-          <p:nvSpPr>
-            <p:cNvPr id="213" name="TextBox 212">
-              <a:extLst>
-                <a:ext uri="{FF2B5EF4-FFF2-40B4-BE49-F238E27FC236}">
-                  <a16:creationId xmlns:a16="http://schemas.microsoft.com/office/drawing/2014/main" id="{C2C8DCC9-B7A5-B94A-920F-73C08EAF620F}"/>
-                </a:ext>
-              </a:extLst>
-            </p:cNvPr>
-            <p:cNvSpPr txBox="1"/>
-            <p:nvPr/>
-          </p:nvSpPr>
-          <p:spPr>
-            <a:xfrm>
-              <a:off x="4282789" y="6069138"/>
-              <a:ext cx="748088" cy="307777"/>
-            </a:xfrm>
-            <a:prstGeom prst="rect">
-              <a:avLst/>
-            </a:prstGeom>
-            <a:noFill/>
-          </p:spPr>
-          <p:txBody>
-            <a:bodyPr wrap="square" rtlCol="0">
-              <a:spAutoFit/>
-            </a:bodyPr>
-            <a:lstStyle/>
-            <a:p>
-              <a:r>
-                <a:rPr lang="en-PH" sz="1400" dirty="0"/>
-                <a:t>SMF</a:t>
-              </a:r>
-            </a:p>
-          </p:txBody>
-        </p:sp>
-        <p:sp>
-          <p:nvSpPr>
-            <p:cNvPr id="51" name="Oval 50">
-              <a:extLst>
-                <a:ext uri="{FF2B5EF4-FFF2-40B4-BE49-F238E27FC236}">
-                  <a16:creationId xmlns:a16="http://schemas.microsoft.com/office/drawing/2014/main" id="{B117B0FD-E6F8-1E84-7374-3F1D5BB3E736}"/>
-                </a:ext>
-              </a:extLst>
-            </p:cNvPr>
-            <p:cNvSpPr/>
-            <p:nvPr/>
-          </p:nvSpPr>
-          <p:spPr>
-            <a:xfrm rot="18230538">
-              <a:off x="5322617" y="5007748"/>
-              <a:ext cx="346671" cy="808723"/>
-            </a:xfrm>
-            <a:prstGeom prst="ellipse">
-              <a:avLst/>
-            </a:prstGeom>
-            <a:solidFill>
-              <a:schemeClr val="accent1">
-                <a:lumMod val="40000"/>
-                <a:lumOff val="60000"/>
-              </a:schemeClr>
-            </a:solidFill>
-            <a:ln>
-              <a:solidFill>
-                <a:schemeClr val="accent1">
-                  <a:lumMod val="40000"/>
-                  <a:lumOff val="60000"/>
-                </a:schemeClr>
-              </a:solidFill>
-            </a:ln>
-          </p:spPr>
-          <p:style>
-            <a:lnRef idx="2">
-              <a:schemeClr val="accent1">
-                <a:shade val="15000"/>
-              </a:schemeClr>
-            </a:lnRef>
-            <a:fillRef idx="1">
-              <a:schemeClr val="accent1"/>
-            </a:fillRef>
-            <a:effectRef idx="0">
-              <a:schemeClr val="accent1"/>
-            </a:effectRef>
-            <a:fontRef idx="minor">
-              <a:schemeClr val="lt1"/>
-            </a:fontRef>
-          </p:style>
-          <p:txBody>
-            <a:bodyPr rtlCol="0" anchor="ctr"/>
-            <a:lstStyle/>
-            <a:p>
-              <a:pPr algn="ctr"/>
-              <a:r>
-                <a:rPr lang="en-US" dirty="0"/>
-                <a:t>L</a:t>
-              </a:r>
-              <a:endParaRPr lang="en-PH" dirty="0"/>
-            </a:p>
-          </p:txBody>
-        </p:sp>
-        <p:sp>
-          <p:nvSpPr>
-            <p:cNvPr id="59" name="Rectangle 58">
-              <a:extLst>
-                <a:ext uri="{FF2B5EF4-FFF2-40B4-BE49-F238E27FC236}">
-                  <a16:creationId xmlns:a16="http://schemas.microsoft.com/office/drawing/2014/main" id="{811847AB-5069-2B81-856A-BCF7BFBB1814}"/>
-                </a:ext>
-              </a:extLst>
-            </p:cNvPr>
-            <p:cNvSpPr/>
-            <p:nvPr/>
-          </p:nvSpPr>
-          <p:spPr>
-            <a:xfrm>
-              <a:off x="3803098" y="5525257"/>
-              <a:ext cx="257902" cy="503583"/>
-            </a:xfrm>
-            <a:prstGeom prst="rect">
-              <a:avLst/>
-            </a:prstGeom>
-            <a:solidFill>
-              <a:schemeClr val="bg2">
-                <a:lumMod val="50000"/>
-              </a:schemeClr>
-            </a:solidFill>
-            <a:ln>
-              <a:solidFill>
-                <a:schemeClr val="bg2">
-                  <a:lumMod val="25000"/>
-                </a:schemeClr>
-              </a:solidFill>
-            </a:ln>
-          </p:spPr>
-          <p:style>
-            <a:lnRef idx="2">
-              <a:schemeClr val="accent1">
-                <a:shade val="15000"/>
-              </a:schemeClr>
-            </a:lnRef>
-            <a:fillRef idx="1">
-              <a:schemeClr val="accent1"/>
-            </a:fillRef>
-            <a:effectRef idx="0">
-              <a:schemeClr val="accent1"/>
-            </a:effectRef>
-            <a:fontRef idx="minor">
-              <a:schemeClr val="lt1"/>
-            </a:fontRef>
-          </p:style>
-          <p:txBody>
-            <a:bodyPr rtlCol="0" anchor="ctr"/>
-            <a:lstStyle/>
-            <a:p>
-              <a:pPr algn="ctr"/>
-              <a:endParaRPr lang="en-PH" dirty="0"/>
-            </a:p>
-          </p:txBody>
-        </p:sp>
-        <p:sp>
-          <p:nvSpPr>
             <p:cNvPr id="218" name="TextBox 217">
               <a:extLst>
                 <a:ext uri="{FF2B5EF4-FFF2-40B4-BE49-F238E27FC236}">
@@ -5392,7 +4726,7 @@
           </p:nvSpPr>
           <p:spPr>
             <a:xfrm>
-              <a:off x="3492835" y="295576"/>
+              <a:off x="4827489" y="388330"/>
               <a:ext cx="1737435" cy="307777"/>
             </a:xfrm>
             <a:prstGeom prst="rect">
@@ -5425,79 +4759,6 @@
         </p:sp>
         <p:sp>
           <p:nvSpPr>
-            <p:cNvPr id="223" name="TextBox 222">
-              <a:extLst>
-                <a:ext uri="{FF2B5EF4-FFF2-40B4-BE49-F238E27FC236}">
-                  <a16:creationId xmlns:a16="http://schemas.microsoft.com/office/drawing/2014/main" id="{A6075877-9FC9-D398-681B-B97D1CFA1CA1}"/>
-                </a:ext>
-              </a:extLst>
-            </p:cNvPr>
-            <p:cNvSpPr txBox="1"/>
-            <p:nvPr/>
-          </p:nvSpPr>
-          <p:spPr>
-            <a:xfrm>
-              <a:off x="1684809" y="5901974"/>
-              <a:ext cx="1557978" cy="307777"/>
-            </a:xfrm>
-            <a:prstGeom prst="rect">
-              <a:avLst/>
-            </a:prstGeom>
-            <a:noFill/>
-          </p:spPr>
-          <p:txBody>
-            <a:bodyPr wrap="square" rtlCol="0">
-              <a:spAutoFit/>
-            </a:bodyPr>
-            <a:lstStyle/>
-            <a:p>
-              <a:r>
-                <a:rPr lang="en-US" sz="1400" dirty="0"/>
-                <a:t>oscilloscope</a:t>
-              </a:r>
-              <a:endParaRPr lang="en-PH" sz="1400" dirty="0"/>
-            </a:p>
-          </p:txBody>
-        </p:sp>
-        <p:sp>
-          <p:nvSpPr>
-            <p:cNvPr id="224" name="TextBox 223">
-              <a:extLst>
-                <a:ext uri="{FF2B5EF4-FFF2-40B4-BE49-F238E27FC236}">
-                  <a16:creationId xmlns:a16="http://schemas.microsoft.com/office/drawing/2014/main" id="{D7F18F9D-FB1E-0A7E-7FA6-00627644CC42}"/>
-                </a:ext>
-              </a:extLst>
-            </p:cNvPr>
-            <p:cNvSpPr txBox="1"/>
-            <p:nvPr/>
-          </p:nvSpPr>
-          <p:spPr>
-            <a:xfrm>
-              <a:off x="3685147" y="5131393"/>
-              <a:ext cx="491788" cy="307777"/>
-            </a:xfrm>
-            <a:prstGeom prst="rect">
-              <a:avLst/>
-            </a:prstGeom>
-            <a:noFill/>
-          </p:spPr>
-          <p:txBody>
-            <a:bodyPr wrap="square" rtlCol="0">
-              <a:spAutoFit/>
-            </a:bodyPr>
-            <a:lstStyle/>
-            <a:p>
-              <a:pPr algn="ctr"/>
-              <a:r>
-                <a:rPr lang="en-US" sz="1400" dirty="0"/>
-                <a:t>PD</a:t>
-              </a:r>
-              <a:endParaRPr lang="en-PH" sz="1400" dirty="0"/>
-            </a:p>
-          </p:txBody>
-        </p:sp>
-        <p:sp>
-          <p:nvSpPr>
             <p:cNvPr id="225" name="TextBox 224">
               <a:extLst>
                 <a:ext uri="{FF2B5EF4-FFF2-40B4-BE49-F238E27FC236}">
@@ -5510,7 +4771,7 @@
           </p:nvSpPr>
           <p:spPr>
             <a:xfrm>
-              <a:off x="6411188" y="2655670"/>
+              <a:off x="7745842" y="2748424"/>
               <a:ext cx="481352" cy="307777"/>
             </a:xfrm>
             <a:prstGeom prst="rect">
@@ -5547,7 +4808,7 @@
           </p:nvSpPr>
           <p:spPr>
             <a:xfrm>
-              <a:off x="3525850" y="1250127"/>
+              <a:off x="4860504" y="1342881"/>
               <a:ext cx="1568747" cy="307777"/>
             </a:xfrm>
             <a:prstGeom prst="rect">
@@ -5584,7 +4845,7 @@
           </p:nvSpPr>
           <p:spPr>
             <a:xfrm rot="5400000">
-              <a:off x="4219304" y="1100501"/>
+              <a:off x="5553958" y="1193255"/>
               <a:ext cx="126970" cy="1108938"/>
             </a:xfrm>
             <a:prstGeom prst="leftBrace">
@@ -5619,68 +4880,6 @@
         </p:sp>
         <p:sp>
           <p:nvSpPr>
-            <p:cNvPr id="8" name="Rectangle 7">
-              <a:extLst>
-                <a:ext uri="{FF2B5EF4-FFF2-40B4-BE49-F238E27FC236}">
-                  <a16:creationId xmlns:a16="http://schemas.microsoft.com/office/drawing/2014/main" id="{BEC40115-50D6-B8FE-6245-040DE37A019E}"/>
-                </a:ext>
-              </a:extLst>
-            </p:cNvPr>
-            <p:cNvSpPr/>
-            <p:nvPr/>
-          </p:nvSpPr>
-          <p:spPr>
-            <a:xfrm rot="1359346">
-              <a:off x="1825413" y="2195347"/>
-              <a:ext cx="581513" cy="193058"/>
-            </a:xfrm>
-            <a:prstGeom prst="rect">
-              <a:avLst/>
-            </a:prstGeom>
-            <a:solidFill>
-              <a:schemeClr val="bg2">
-                <a:lumMod val="75000"/>
-              </a:schemeClr>
-            </a:solidFill>
-            <a:ln>
-              <a:solidFill>
-                <a:schemeClr val="bg2">
-                  <a:lumMod val="75000"/>
-                </a:schemeClr>
-              </a:solidFill>
-            </a:ln>
-          </p:spPr>
-          <p:style>
-            <a:lnRef idx="2">
-              <a:schemeClr val="accent1">
-                <a:shade val="15000"/>
-              </a:schemeClr>
-            </a:lnRef>
-            <a:fillRef idx="1">
-              <a:schemeClr val="accent1"/>
-            </a:fillRef>
-            <a:effectRef idx="0">
-              <a:schemeClr val="accent1"/>
-            </a:effectRef>
-            <a:fontRef idx="minor">
-              <a:schemeClr val="lt1"/>
-            </a:fontRef>
-          </p:style>
-          <p:txBody>
-            <a:bodyPr rtlCol="0" anchor="ctr"/>
-            <a:lstStyle/>
-            <a:p>
-              <a:pPr algn="ctr"/>
-              <a:r>
-                <a:rPr lang="en-US" dirty="0"/>
-                <a:t>M</a:t>
-              </a:r>
-              <a:endParaRPr lang="en-PH" dirty="0"/>
-            </a:p>
-          </p:txBody>
-        </p:sp>
-        <p:sp>
-          <p:nvSpPr>
             <p:cNvPr id="9" name="Rectangle 8">
               <a:extLst>
                 <a:ext uri="{FF2B5EF4-FFF2-40B4-BE49-F238E27FC236}">
@@ -5693,7 +4892,7 @@
           </p:nvSpPr>
           <p:spPr>
             <a:xfrm rot="19515393">
-              <a:off x="1823447" y="600008"/>
+              <a:off x="3158101" y="692762"/>
               <a:ext cx="581513" cy="193058"/>
             </a:xfrm>
             <a:prstGeom prst="rect">
@@ -5759,7 +4958,7 @@
           </p:nvCxnSpPr>
           <p:spPr>
             <a:xfrm flipV="1">
-              <a:off x="2153352" y="775856"/>
+              <a:off x="3488006" y="868610"/>
               <a:ext cx="15864" cy="1426940"/>
             </a:xfrm>
             <a:prstGeom prst="line">
@@ -5804,7 +5003,7 @@
           </p:nvCxnSpPr>
           <p:spPr>
             <a:xfrm flipH="1">
-              <a:off x="2153352" y="2201492"/>
+              <a:off x="3488006" y="2294246"/>
               <a:ext cx="1417749" cy="1304"/>
             </a:xfrm>
             <a:prstGeom prst="line">
@@ -5831,108 +5030,171 @@
             </a:fontRef>
           </p:style>
         </p:cxnSp>
-      </p:grpSp>
-    </p:spTree>
-    <p:extLst>
-      <p:ext uri="{BB962C8B-B14F-4D97-AF65-F5344CB8AC3E}">
-        <p14:creationId xmlns:p14="http://schemas.microsoft.com/office/powerpoint/2010/main" val="4045802984"/>
-      </p:ext>
-    </p:extLst>
-  </p:cSld>
-  <p:clrMapOvr>
-    <a:masterClrMapping/>
-  </p:clrMapOvr>
-</p:sld>
-</file>
-
-<file path=ppt/slides/slide2.xml><?xml version="1.0" encoding="utf-8"?>
-<p:sld xmlns:a="http://schemas.openxmlformats.org/drawingml/2006/main" xmlns:r="http://schemas.openxmlformats.org/officeDocument/2006/relationships" xmlns:p="http://schemas.openxmlformats.org/presentationml/2006/main">
-  <p:cSld>
-    <p:spTree>
-      <p:nvGrpSpPr>
-        <p:cNvPr id="1" name=""/>
-        <p:cNvGrpSpPr/>
-        <p:nvPr/>
-      </p:nvGrpSpPr>
-      <p:grpSpPr>
-        <a:xfrm>
-          <a:off x="0" y="0"/>
-          <a:ext cx="0" cy="0"/>
-          <a:chOff x="0" y="0"/>
-          <a:chExt cx="0" cy="0"/>
-        </a:xfrm>
-      </p:grpSpPr>
-      <p:grpSp>
-        <p:nvGrpSpPr>
-          <p:cNvPr id="19" name="Group 18">
-            <a:extLst>
-              <a:ext uri="{FF2B5EF4-FFF2-40B4-BE49-F238E27FC236}">
-                <a16:creationId xmlns:a16="http://schemas.microsoft.com/office/drawing/2014/main" id="{6FF1D5B3-BCC0-BDA4-7291-519CBC771836}"/>
-              </a:ext>
-            </a:extLst>
-          </p:cNvPr>
-          <p:cNvGrpSpPr/>
-          <p:nvPr/>
-        </p:nvGrpSpPr>
-        <p:grpSpPr>
-          <a:xfrm>
-            <a:off x="3019463" y="388330"/>
-            <a:ext cx="6153073" cy="6081339"/>
-            <a:chOff x="1684809" y="295576"/>
-            <a:chExt cx="6153073" cy="6081339"/>
-          </a:xfrm>
-        </p:grpSpPr>
-        <mc:AlternateContent xmlns:mc="http://schemas.openxmlformats.org/markup-compatibility/2006">
-          <mc:Choice xmlns:p14="http://schemas.microsoft.com/office/powerpoint/2010/main" Requires="p14">
-            <p:contentPart p14:bwMode="auto" r:id="rId3">
-              <p14:nvContentPartPr>
-                <p14:cNvPr id="208" name="Ink 207">
-                  <a:extLst>
-                    <a:ext uri="{FF2B5EF4-FFF2-40B4-BE49-F238E27FC236}">
-                      <a16:creationId xmlns:a16="http://schemas.microsoft.com/office/drawing/2014/main" id="{A5995E24-964D-C220-2940-F4E75720C59F}"/>
-                    </a:ext>
-                  </a:extLst>
-                </p14:cNvPr>
-                <p14:cNvContentPartPr/>
-                <p14:nvPr/>
-              </p14:nvContentPartPr>
-              <p14:xfrm>
-                <a:off x="4033753" y="5777049"/>
-                <a:ext cx="1114920" cy="289080"/>
-              </p14:xfrm>
-            </p:contentPart>
-          </mc:Choice>
-          <mc:Fallback>
-            <p:pic>
-              <p:nvPicPr>
-                <p:cNvPr id="208" name="Ink 207">
-                  <a:extLst>
-                    <a:ext uri="{FF2B5EF4-FFF2-40B4-BE49-F238E27FC236}">
-                      <a16:creationId xmlns:a16="http://schemas.microsoft.com/office/drawing/2014/main" id="{A5995E24-964D-C220-2940-F4E75720C59F}"/>
-                    </a:ext>
-                  </a:extLst>
-                </p:cNvPr>
-                <p:cNvPicPr/>
-                <p:nvPr/>
-              </p:nvPicPr>
-              <p:blipFill>
-                <a:blip r:embed="rId4"/>
-                <a:stretch>
-                  <a:fillRect/>
-                </a:stretch>
-              </p:blipFill>
-              <p:spPr>
-                <a:xfrm>
-                  <a:off x="4015759" y="5759049"/>
-                  <a:ext cx="1150548" cy="324720"/>
-                </a:xfrm>
-                <a:prstGeom prst="rect">
-                  <a:avLst/>
-                </a:prstGeom>
-              </p:spPr>
-            </p:pic>
-          </mc:Fallback>
-        </mc:AlternateContent>
+        <p:sp>
+          <p:nvSpPr>
+            <p:cNvPr id="12" name="TextBox 11">
+              <a:extLst>
+                <a:ext uri="{FF2B5EF4-FFF2-40B4-BE49-F238E27FC236}">
+                  <a16:creationId xmlns:a16="http://schemas.microsoft.com/office/drawing/2014/main" id="{0B264088-ACA5-7BB5-34BA-8694BA59106B}"/>
+                </a:ext>
+              </a:extLst>
+            </p:cNvPr>
+            <p:cNvSpPr txBox="1"/>
+            <p:nvPr/>
+          </p:nvSpPr>
+          <p:spPr>
+            <a:xfrm>
+              <a:off x="6701263" y="4381903"/>
+              <a:ext cx="481352" cy="307777"/>
+            </a:xfrm>
+            <a:prstGeom prst="rect">
+              <a:avLst/>
+            </a:prstGeom>
+            <a:noFill/>
+          </p:spPr>
+          <p:txBody>
+            <a:bodyPr wrap="square" rtlCol="0">
+              <a:spAutoFit/>
+            </a:bodyPr>
+            <a:lstStyle/>
+            <a:p>
+              <a:pPr algn="ctr"/>
+              <a:r>
+                <a:rPr lang="en-US" sz="1400" dirty="0"/>
+                <a:t>BS</a:t>
+              </a:r>
+              <a:endParaRPr lang="en-PH" sz="1400" dirty="0"/>
+            </a:p>
+          </p:txBody>
+        </p:sp>
+        <p:sp>
+          <p:nvSpPr>
+            <p:cNvPr id="57" name="Oval 56">
+              <a:extLst>
+                <a:ext uri="{FF2B5EF4-FFF2-40B4-BE49-F238E27FC236}">
+                  <a16:creationId xmlns:a16="http://schemas.microsoft.com/office/drawing/2014/main" id="{30FE1409-7865-8710-384F-5B9D104D10C7}"/>
+                </a:ext>
+              </a:extLst>
+            </p:cNvPr>
+            <p:cNvSpPr/>
+            <p:nvPr/>
+          </p:nvSpPr>
+          <p:spPr>
+            <a:xfrm>
+              <a:off x="4502108" y="4083740"/>
+              <a:ext cx="64233" cy="157859"/>
+            </a:xfrm>
+            <a:prstGeom prst="ellipse">
+              <a:avLst/>
+            </a:prstGeom>
+            <a:solidFill>
+              <a:schemeClr val="tx1"/>
+            </a:solidFill>
+            <a:ln>
+              <a:solidFill>
+                <a:schemeClr val="tx1"/>
+              </a:solidFill>
+            </a:ln>
+          </p:spPr>
+          <p:style>
+            <a:lnRef idx="2">
+              <a:schemeClr val="accent1">
+                <a:shade val="15000"/>
+              </a:schemeClr>
+            </a:lnRef>
+            <a:fillRef idx="1">
+              <a:schemeClr val="accent1"/>
+            </a:fillRef>
+            <a:effectRef idx="0">
+              <a:schemeClr val="accent1"/>
+            </a:effectRef>
+            <a:fontRef idx="minor">
+              <a:schemeClr val="lt1"/>
+            </a:fontRef>
+          </p:style>
+          <p:txBody>
+            <a:bodyPr rtlCol="0" anchor="ctr"/>
+            <a:lstStyle/>
+            <a:p>
+              <a:pPr algn="ctr"/>
+              <a:endParaRPr lang="en-PH"/>
+            </a:p>
+          </p:txBody>
+        </p:sp>
+        <p:pic>
+          <p:nvPicPr>
+            <p:cNvPr id="211" name="Picture 210" descr="A screen with a graph on it&#10;&#10;Description automatically generated">
+              <a:extLst>
+                <a:ext uri="{FF2B5EF4-FFF2-40B4-BE49-F238E27FC236}">
+                  <a16:creationId xmlns:a16="http://schemas.microsoft.com/office/drawing/2014/main" id="{D56096F2-7DBC-CFA4-F5E1-1DC73879E417}"/>
+                </a:ext>
+              </a:extLst>
+            </p:cNvPr>
+            <p:cNvPicPr>
+              <a:picLocks noChangeAspect="1"/>
+            </p:cNvPicPr>
+            <p:nvPr/>
+          </p:nvPicPr>
+          <p:blipFill>
+            <a:blip r:embed="rId5">
+              <a:extLst>
+                <a:ext uri="{28A0092B-C50C-407E-A947-70E740481C1C}">
+                  <a14:useLocalDpi xmlns:a14="http://schemas.microsoft.com/office/drawing/2010/main" val="0"/>
+                </a:ext>
+                <a:ext uri="{837473B0-CC2E-450A-ABE3-18F120FF3D39}">
+                  <a1611:picAttrSrcUrl xmlns:a1611="http://schemas.microsoft.com/office/drawing/2016/11/main" r:id="rId6"/>
+                </a:ext>
+              </a:extLst>
+            </a:blip>
+            <a:stretch>
+              <a:fillRect/>
+            </a:stretch>
+          </p:blipFill>
+          <p:spPr>
+            <a:xfrm>
+              <a:off x="1519295" y="3810295"/>
+              <a:ext cx="1033491" cy="546889"/>
+            </a:xfrm>
+            <a:prstGeom prst="rect">
+              <a:avLst/>
+            </a:prstGeom>
+          </p:spPr>
+        </p:pic>
+        <p:sp>
+          <p:nvSpPr>
+            <p:cNvPr id="213" name="TextBox 212">
+              <a:extLst>
+                <a:ext uri="{FF2B5EF4-FFF2-40B4-BE49-F238E27FC236}">
+                  <a16:creationId xmlns:a16="http://schemas.microsoft.com/office/drawing/2014/main" id="{C2C8DCC9-B7A5-B94A-920F-73C08EAF620F}"/>
+                </a:ext>
+              </a:extLst>
+            </p:cNvPr>
+            <p:cNvSpPr txBox="1"/>
+            <p:nvPr/>
+          </p:nvSpPr>
+          <p:spPr>
+            <a:xfrm>
+              <a:off x="3665768" y="4240586"/>
+              <a:ext cx="748088" cy="307777"/>
+            </a:xfrm>
+            <a:prstGeom prst="rect">
+              <a:avLst/>
+            </a:prstGeom>
+            <a:noFill/>
+          </p:spPr>
+          <p:txBody>
+            <a:bodyPr wrap="square" rtlCol="0">
+              <a:spAutoFit/>
+            </a:bodyPr>
+            <a:lstStyle/>
+            <a:p>
+              <a:r>
+                <a:rPr lang="en-PH" sz="1400" dirty="0"/>
+                <a:t>SMF</a:t>
+              </a:r>
+            </a:p>
+          </p:txBody>
+        </p:sp>
         <p:sp>
           <p:nvSpPr>
             <p:cNvPr id="128" name="Isosceles Triangle 127">
@@ -5946,8 +5208,8 @@
             <p:nvPr/>
           </p:nvSpPr>
           <p:spPr>
-            <a:xfrm rot="12676046">
-              <a:off x="5707131" y="4944701"/>
+            <a:xfrm rot="15907941">
+              <a:off x="5519446" y="4084925"/>
               <a:ext cx="89810" cy="161689"/>
             </a:xfrm>
             <a:prstGeom prst="triangle">
@@ -5991,624 +5253,6 @@
         </p:sp>
         <p:sp>
           <p:nvSpPr>
-            <p:cNvPr id="124" name="Isosceles Triangle 123">
-              <a:extLst>
-                <a:ext uri="{FF2B5EF4-FFF2-40B4-BE49-F238E27FC236}">
-                  <a16:creationId xmlns:a16="http://schemas.microsoft.com/office/drawing/2014/main" id="{2A60C6D9-1A61-E2A5-9E74-9F56BB1679E4}"/>
-                </a:ext>
-              </a:extLst>
-            </p:cNvPr>
-            <p:cNvSpPr/>
-            <p:nvPr/>
-          </p:nvSpPr>
-          <p:spPr>
-            <a:xfrm rot="5400000">
-              <a:off x="3966981" y="2125193"/>
-              <a:ext cx="89810" cy="161689"/>
-            </a:xfrm>
-            <a:prstGeom prst="triangle">
-              <a:avLst>
-                <a:gd name="adj" fmla="val 51244"/>
-              </a:avLst>
-            </a:prstGeom>
-            <a:solidFill>
-              <a:srgbClr val="FF0000"/>
-            </a:solidFill>
-            <a:ln>
-              <a:solidFill>
-                <a:srgbClr val="FF0000"/>
-              </a:solidFill>
-            </a:ln>
-          </p:spPr>
-          <p:style>
-            <a:lnRef idx="2">
-              <a:schemeClr val="accent1">
-                <a:shade val="15000"/>
-              </a:schemeClr>
-            </a:lnRef>
-            <a:fillRef idx="1">
-              <a:schemeClr val="accent1"/>
-            </a:fillRef>
-            <a:effectRef idx="0">
-              <a:schemeClr val="accent1"/>
-            </a:effectRef>
-            <a:fontRef idx="minor">
-              <a:schemeClr val="lt1"/>
-            </a:fontRef>
-          </p:style>
-          <p:txBody>
-            <a:bodyPr rtlCol="0" anchor="ctr"/>
-            <a:lstStyle/>
-            <a:p>
-              <a:pPr algn="ctr"/>
-              <a:endParaRPr lang="en-PH"/>
-            </a:p>
-          </p:txBody>
-        </p:sp>
-        <p:sp>
-          <p:nvSpPr>
-            <p:cNvPr id="127" name="Isosceles Triangle 126">
-              <a:extLst>
-                <a:ext uri="{FF2B5EF4-FFF2-40B4-BE49-F238E27FC236}">
-                  <a16:creationId xmlns:a16="http://schemas.microsoft.com/office/drawing/2014/main" id="{3286FE12-7650-6830-6458-35FA66D14BD1}"/>
-                </a:ext>
-              </a:extLst>
-            </p:cNvPr>
-            <p:cNvSpPr/>
-            <p:nvPr/>
-          </p:nvSpPr>
-          <p:spPr>
-            <a:xfrm rot="16200000">
-              <a:off x="4290470" y="1951783"/>
-              <a:ext cx="216777" cy="516128"/>
-            </a:xfrm>
-            <a:prstGeom prst="triangle">
-              <a:avLst>
-                <a:gd name="adj" fmla="val 51244"/>
-              </a:avLst>
-            </a:prstGeom>
-            <a:solidFill>
-              <a:srgbClr val="FF0000"/>
-            </a:solidFill>
-            <a:ln>
-              <a:solidFill>
-                <a:srgbClr val="FF0000"/>
-              </a:solidFill>
-            </a:ln>
-          </p:spPr>
-          <p:style>
-            <a:lnRef idx="2">
-              <a:schemeClr val="accent1">
-                <a:shade val="15000"/>
-              </a:schemeClr>
-            </a:lnRef>
-            <a:fillRef idx="1">
-              <a:schemeClr val="accent1"/>
-            </a:fillRef>
-            <a:effectRef idx="0">
-              <a:schemeClr val="accent1"/>
-            </a:effectRef>
-            <a:fontRef idx="minor">
-              <a:schemeClr val="lt1"/>
-            </a:fontRef>
-          </p:style>
-          <p:txBody>
-            <a:bodyPr rtlCol="0" anchor="ctr"/>
-            <a:lstStyle/>
-            <a:p>
-              <a:pPr algn="ctr"/>
-              <a:endParaRPr lang="en-PH"/>
-            </a:p>
-          </p:txBody>
-        </p:sp>
-        <p:cxnSp>
-          <p:nvCxnSpPr>
-            <p:cNvPr id="72" name="Straight Connector 71">
-              <a:extLst>
-                <a:ext uri="{FF2B5EF4-FFF2-40B4-BE49-F238E27FC236}">
-                  <a16:creationId xmlns:a16="http://schemas.microsoft.com/office/drawing/2014/main" id="{87EA49A5-FAB8-1987-0767-8E09FC8A67DB}"/>
-                </a:ext>
-              </a:extLst>
-            </p:cNvPr>
-            <p:cNvCxnSpPr>
-              <a:cxnSpLocks/>
-              <a:endCxn id="11" idx="2"/>
-            </p:cNvCxnSpPr>
-            <p:nvPr/>
-          </p:nvCxnSpPr>
-          <p:spPr>
-            <a:xfrm flipV="1">
-              <a:off x="7058209" y="2230742"/>
-              <a:ext cx="333798" cy="999835"/>
-            </a:xfrm>
-            <a:prstGeom prst="line">
-              <a:avLst/>
-            </a:prstGeom>
-            <a:ln w="57150">
-              <a:solidFill>
-                <a:schemeClr val="accent2">
-                  <a:lumMod val="60000"/>
-                  <a:lumOff val="40000"/>
-                </a:schemeClr>
-              </a:solidFill>
-            </a:ln>
-          </p:spPr>
-          <p:style>
-            <a:lnRef idx="2">
-              <a:schemeClr val="accent1"/>
-            </a:lnRef>
-            <a:fillRef idx="0">
-              <a:schemeClr val="accent1"/>
-            </a:fillRef>
-            <a:effectRef idx="1">
-              <a:schemeClr val="accent1"/>
-            </a:effectRef>
-            <a:fontRef idx="minor">
-              <a:schemeClr val="tx1"/>
-            </a:fontRef>
-          </p:style>
-        </p:cxnSp>
-        <p:cxnSp>
-          <p:nvCxnSpPr>
-            <p:cNvPr id="70" name="Straight Connector 69">
-              <a:extLst>
-                <a:ext uri="{FF2B5EF4-FFF2-40B4-BE49-F238E27FC236}">
-                  <a16:creationId xmlns:a16="http://schemas.microsoft.com/office/drawing/2014/main" id="{76B776E8-08A6-9D9D-DEE5-31F993ABD665}"/>
-                </a:ext>
-              </a:extLst>
-            </p:cNvPr>
-            <p:cNvCxnSpPr>
-              <a:cxnSpLocks/>
-              <a:stCxn id="11" idx="2"/>
-            </p:cNvCxnSpPr>
-            <p:nvPr/>
-          </p:nvCxnSpPr>
-          <p:spPr>
-            <a:xfrm flipH="1">
-              <a:off x="7225108" y="2230742"/>
-              <a:ext cx="166899" cy="1103404"/>
-            </a:xfrm>
-            <a:prstGeom prst="line">
-              <a:avLst/>
-            </a:prstGeom>
-            <a:ln w="57150">
-              <a:solidFill>
-                <a:schemeClr val="accent2">
-                  <a:lumMod val="60000"/>
-                  <a:lumOff val="40000"/>
-                </a:schemeClr>
-              </a:solidFill>
-            </a:ln>
-          </p:spPr>
-          <p:style>
-            <a:lnRef idx="2">
-              <a:schemeClr val="accent1"/>
-            </a:lnRef>
-            <a:fillRef idx="0">
-              <a:schemeClr val="accent1"/>
-            </a:fillRef>
-            <a:effectRef idx="1">
-              <a:schemeClr val="accent1"/>
-            </a:effectRef>
-            <a:fontRef idx="minor">
-              <a:schemeClr val="tx1"/>
-            </a:fontRef>
-          </p:style>
-        </p:cxnSp>
-        <p:cxnSp>
-          <p:nvCxnSpPr>
-            <p:cNvPr id="71" name="Straight Connector 70">
-              <a:extLst>
-                <a:ext uri="{FF2B5EF4-FFF2-40B4-BE49-F238E27FC236}">
-                  <a16:creationId xmlns:a16="http://schemas.microsoft.com/office/drawing/2014/main" id="{D33CE784-937D-6E11-9292-FE19D01F65B8}"/>
-                </a:ext>
-              </a:extLst>
-            </p:cNvPr>
-            <p:cNvCxnSpPr>
-              <a:cxnSpLocks/>
-              <a:stCxn id="52" idx="6"/>
-              <a:endCxn id="11" idx="2"/>
-            </p:cNvCxnSpPr>
-            <p:nvPr/>
-          </p:nvCxnSpPr>
-          <p:spPr>
-            <a:xfrm flipV="1">
-              <a:off x="5966241" y="2230742"/>
-              <a:ext cx="1425766" cy="2421379"/>
-            </a:xfrm>
-            <a:prstGeom prst="line">
-              <a:avLst/>
-            </a:prstGeom>
-            <a:ln w="57150">
-              <a:solidFill>
-                <a:srgbClr val="FF0000"/>
-              </a:solidFill>
-            </a:ln>
-          </p:spPr>
-          <p:style>
-            <a:lnRef idx="2">
-              <a:schemeClr val="accent1"/>
-            </a:lnRef>
-            <a:fillRef idx="0">
-              <a:schemeClr val="accent1"/>
-            </a:fillRef>
-            <a:effectRef idx="1">
-              <a:schemeClr val="accent1"/>
-            </a:effectRef>
-            <a:fontRef idx="minor">
-              <a:schemeClr val="tx1"/>
-            </a:fontRef>
-          </p:style>
-        </p:cxnSp>
-        <p:cxnSp>
-          <p:nvCxnSpPr>
-            <p:cNvPr id="67" name="Straight Connector 66">
-              <a:extLst>
-                <a:ext uri="{FF2B5EF4-FFF2-40B4-BE49-F238E27FC236}">
-                  <a16:creationId xmlns:a16="http://schemas.microsoft.com/office/drawing/2014/main" id="{83C62264-1D00-0D28-ECCA-ED140E5B0A57}"/>
-                </a:ext>
-              </a:extLst>
-            </p:cNvPr>
-            <p:cNvCxnSpPr>
-              <a:cxnSpLocks/>
-              <a:stCxn id="10" idx="1"/>
-              <a:endCxn id="9" idx="2"/>
-            </p:cNvCxnSpPr>
-            <p:nvPr/>
-          </p:nvCxnSpPr>
-          <p:spPr>
-            <a:xfrm flipH="1" flipV="1">
-              <a:off x="2169216" y="775856"/>
-              <a:ext cx="1496834" cy="19229"/>
-            </a:xfrm>
-            <a:prstGeom prst="line">
-              <a:avLst/>
-            </a:prstGeom>
-            <a:ln w="57150">
-              <a:solidFill>
-                <a:srgbClr val="FF0000"/>
-              </a:solidFill>
-            </a:ln>
-          </p:spPr>
-          <p:style>
-            <a:lnRef idx="2">
-              <a:schemeClr val="accent1"/>
-            </a:lnRef>
-            <a:fillRef idx="0">
-              <a:schemeClr val="accent1"/>
-            </a:fillRef>
-            <a:effectRef idx="1">
-              <a:schemeClr val="accent1"/>
-            </a:effectRef>
-            <a:fontRef idx="minor">
-              <a:schemeClr val="tx1"/>
-            </a:fontRef>
-          </p:style>
-        </p:cxnSp>
-        <p:sp>
-          <p:nvSpPr>
-            <p:cNvPr id="65" name="Rectangle 64">
-              <a:extLst>
-                <a:ext uri="{FF2B5EF4-FFF2-40B4-BE49-F238E27FC236}">
-                  <a16:creationId xmlns:a16="http://schemas.microsoft.com/office/drawing/2014/main" id="{D382C561-0712-DB30-3FCC-30FEC9C87E40}"/>
-                </a:ext>
-              </a:extLst>
-            </p:cNvPr>
-            <p:cNvSpPr/>
-            <p:nvPr/>
-          </p:nvSpPr>
-          <p:spPr>
-            <a:xfrm>
-              <a:off x="4954826" y="2070336"/>
-              <a:ext cx="2543935" cy="275345"/>
-            </a:xfrm>
-            <a:prstGeom prst="rect">
-              <a:avLst/>
-            </a:prstGeom>
-            <a:solidFill>
-              <a:srgbClr val="FF0000"/>
-            </a:solidFill>
-            <a:ln>
-              <a:solidFill>
-                <a:srgbClr val="FF0000"/>
-              </a:solidFill>
-            </a:ln>
-          </p:spPr>
-          <p:style>
-            <a:lnRef idx="2">
-              <a:schemeClr val="accent1">
-                <a:shade val="15000"/>
-              </a:schemeClr>
-            </a:lnRef>
-            <a:fillRef idx="1">
-              <a:schemeClr val="accent1"/>
-            </a:fillRef>
-            <a:effectRef idx="0">
-              <a:schemeClr val="accent1"/>
-            </a:effectRef>
-            <a:fontRef idx="minor">
-              <a:schemeClr val="lt1"/>
-            </a:fontRef>
-          </p:style>
-          <p:txBody>
-            <a:bodyPr rtlCol="0" anchor="ctr"/>
-            <a:lstStyle/>
-            <a:p>
-              <a:pPr algn="ctr"/>
-              <a:endParaRPr lang="en-PH"/>
-            </a:p>
-          </p:txBody>
-        </p:sp>
-        <p:sp>
-          <p:nvSpPr>
-            <p:cNvPr id="6" name="Oval 5">
-              <a:extLst>
-                <a:ext uri="{FF2B5EF4-FFF2-40B4-BE49-F238E27FC236}">
-                  <a16:creationId xmlns:a16="http://schemas.microsoft.com/office/drawing/2014/main" id="{C56DEABC-EC5C-E34C-8776-BB5DF453B269}"/>
-                </a:ext>
-              </a:extLst>
-            </p:cNvPr>
-            <p:cNvSpPr/>
-            <p:nvPr/>
-          </p:nvSpPr>
-          <p:spPr>
-            <a:xfrm>
-              <a:off x="3571101" y="1760857"/>
-              <a:ext cx="370515" cy="881269"/>
-            </a:xfrm>
-            <a:prstGeom prst="ellipse">
-              <a:avLst/>
-            </a:prstGeom>
-            <a:solidFill>
-              <a:schemeClr val="accent1">
-                <a:lumMod val="40000"/>
-                <a:lumOff val="60000"/>
-              </a:schemeClr>
-            </a:solidFill>
-            <a:ln>
-              <a:solidFill>
-                <a:schemeClr val="accent1">
-                  <a:lumMod val="40000"/>
-                  <a:lumOff val="60000"/>
-                </a:schemeClr>
-              </a:solidFill>
-            </a:ln>
-          </p:spPr>
-          <p:style>
-            <a:lnRef idx="2">
-              <a:schemeClr val="accent1">
-                <a:shade val="15000"/>
-              </a:schemeClr>
-            </a:lnRef>
-            <a:fillRef idx="1">
-              <a:schemeClr val="accent1"/>
-            </a:fillRef>
-            <a:effectRef idx="0">
-              <a:schemeClr val="accent1"/>
-            </a:effectRef>
-            <a:fontRef idx="minor">
-              <a:schemeClr val="lt1"/>
-            </a:fontRef>
-          </p:style>
-          <p:txBody>
-            <a:bodyPr rtlCol="0" anchor="ctr"/>
-            <a:lstStyle/>
-            <a:p>
-              <a:pPr algn="ctr"/>
-              <a:r>
-                <a:rPr lang="en-US" dirty="0"/>
-                <a:t>L</a:t>
-              </a:r>
-              <a:endParaRPr lang="en-PH" dirty="0"/>
-            </a:p>
-          </p:txBody>
-        </p:sp>
-        <p:sp>
-          <p:nvSpPr>
-            <p:cNvPr id="7" name="Oval 6">
-              <a:extLst>
-                <a:ext uri="{FF2B5EF4-FFF2-40B4-BE49-F238E27FC236}">
-                  <a16:creationId xmlns:a16="http://schemas.microsoft.com/office/drawing/2014/main" id="{69DACEBA-542B-3235-5FEF-38E665F83F21}"/>
-                </a:ext>
-              </a:extLst>
-            </p:cNvPr>
-            <p:cNvSpPr/>
-            <p:nvPr/>
-          </p:nvSpPr>
-          <p:spPr>
-            <a:xfrm>
-              <a:off x="4663069" y="1755744"/>
-              <a:ext cx="370515" cy="881269"/>
-            </a:xfrm>
-            <a:prstGeom prst="ellipse">
-              <a:avLst/>
-            </a:prstGeom>
-            <a:solidFill>
-              <a:schemeClr val="accent1">
-                <a:lumMod val="40000"/>
-                <a:lumOff val="60000"/>
-              </a:schemeClr>
-            </a:solidFill>
-            <a:ln>
-              <a:solidFill>
-                <a:schemeClr val="accent1">
-                  <a:lumMod val="40000"/>
-                  <a:lumOff val="60000"/>
-                </a:schemeClr>
-              </a:solidFill>
-            </a:ln>
-          </p:spPr>
-          <p:style>
-            <a:lnRef idx="2">
-              <a:schemeClr val="accent1">
-                <a:shade val="15000"/>
-              </a:schemeClr>
-            </a:lnRef>
-            <a:fillRef idx="1">
-              <a:schemeClr val="accent1"/>
-            </a:fillRef>
-            <a:effectRef idx="0">
-              <a:schemeClr val="accent1"/>
-            </a:effectRef>
-            <a:fontRef idx="minor">
-              <a:schemeClr val="lt1"/>
-            </a:fontRef>
-          </p:style>
-          <p:txBody>
-            <a:bodyPr rtlCol="0" anchor="ctr"/>
-            <a:lstStyle/>
-            <a:p>
-              <a:pPr algn="ctr"/>
-              <a:r>
-                <a:rPr lang="en-US" dirty="0"/>
-                <a:t>L</a:t>
-              </a:r>
-              <a:endParaRPr lang="en-PH" dirty="0"/>
-            </a:p>
-          </p:txBody>
-        </p:sp>
-        <p:sp>
-          <p:nvSpPr>
-            <p:cNvPr id="10" name="Rectangle 9">
-              <a:extLst>
-                <a:ext uri="{FF2B5EF4-FFF2-40B4-BE49-F238E27FC236}">
-                  <a16:creationId xmlns:a16="http://schemas.microsoft.com/office/drawing/2014/main" id="{ED1A7A22-5C78-77B4-85FC-1D73DBF1EEB0}"/>
-                </a:ext>
-              </a:extLst>
-            </p:cNvPr>
-            <p:cNvSpPr/>
-            <p:nvPr/>
-          </p:nvSpPr>
-          <p:spPr>
-            <a:xfrm>
-              <a:off x="3666050" y="596428"/>
-              <a:ext cx="1331800" cy="397313"/>
-            </a:xfrm>
-            <a:prstGeom prst="rect">
-              <a:avLst/>
-            </a:prstGeom>
-            <a:solidFill>
-              <a:schemeClr val="tx1"/>
-            </a:solidFill>
-          </p:spPr>
-          <p:style>
-            <a:lnRef idx="2">
-              <a:schemeClr val="accent1">
-                <a:shade val="15000"/>
-              </a:schemeClr>
-            </a:lnRef>
-            <a:fillRef idx="1">
-              <a:schemeClr val="accent1"/>
-            </a:fillRef>
-            <a:effectRef idx="0">
-              <a:schemeClr val="accent1"/>
-            </a:effectRef>
-            <a:fontRef idx="minor">
-              <a:schemeClr val="lt1"/>
-            </a:fontRef>
-          </p:style>
-          <p:txBody>
-            <a:bodyPr rtlCol="0" anchor="ctr"/>
-            <a:lstStyle/>
-            <a:p>
-              <a:pPr algn="ctr"/>
-              <a:r>
-                <a:rPr lang="en-PH" dirty="0"/>
-                <a:t>laser</a:t>
-              </a:r>
-            </a:p>
-          </p:txBody>
-        </p:sp>
-        <p:sp>
-          <p:nvSpPr>
-            <p:cNvPr id="11" name="Rectangle 10">
-              <a:extLst>
-                <a:ext uri="{FF2B5EF4-FFF2-40B4-BE49-F238E27FC236}">
-                  <a16:creationId xmlns:a16="http://schemas.microsoft.com/office/drawing/2014/main" id="{671F1184-B2F3-7CDF-E3E7-4EAA9E4D945B}"/>
-                </a:ext>
-              </a:extLst>
-            </p:cNvPr>
-            <p:cNvSpPr/>
-            <p:nvPr/>
-          </p:nvSpPr>
-          <p:spPr>
-            <a:xfrm rot="3025603">
-              <a:off x="7123653" y="1818543"/>
-              <a:ext cx="924876" cy="503583"/>
-            </a:xfrm>
-            <a:prstGeom prst="rect">
-              <a:avLst/>
-            </a:prstGeom>
-          </p:spPr>
-          <p:style>
-            <a:lnRef idx="2">
-              <a:schemeClr val="accent1">
-                <a:shade val="15000"/>
-              </a:schemeClr>
-            </a:lnRef>
-            <a:fillRef idx="1">
-              <a:schemeClr val="accent1"/>
-            </a:fillRef>
-            <a:effectRef idx="0">
-              <a:schemeClr val="accent1"/>
-            </a:effectRef>
-            <a:fontRef idx="minor">
-              <a:schemeClr val="lt1"/>
-            </a:fontRef>
-          </p:style>
-          <p:txBody>
-            <a:bodyPr rtlCol="0" anchor="ctr"/>
-            <a:lstStyle/>
-            <a:p>
-              <a:pPr algn="ctr"/>
-              <a:r>
-                <a:rPr lang="en-PH" dirty="0"/>
-                <a:t>SLM</a:t>
-              </a:r>
-            </a:p>
-          </p:txBody>
-        </p:sp>
-        <p:cxnSp>
-          <p:nvCxnSpPr>
-            <p:cNvPr id="14" name="Straight Connector 13">
-              <a:extLst>
-                <a:ext uri="{FF2B5EF4-FFF2-40B4-BE49-F238E27FC236}">
-                  <a16:creationId xmlns:a16="http://schemas.microsoft.com/office/drawing/2014/main" id="{971975C2-E710-7EBC-D18D-F26D104FC240}"/>
-                </a:ext>
-              </a:extLst>
-            </p:cNvPr>
-            <p:cNvCxnSpPr>
-              <a:cxnSpLocks/>
-            </p:cNvCxnSpPr>
-            <p:nvPr/>
-          </p:nvCxnSpPr>
-          <p:spPr>
-            <a:xfrm>
-              <a:off x="6909751" y="3141088"/>
-              <a:ext cx="315357" cy="193058"/>
-            </a:xfrm>
-            <a:prstGeom prst="line">
-              <a:avLst/>
-            </a:prstGeom>
-            <a:ln w="76200"/>
-          </p:spPr>
-          <p:style>
-            <a:lnRef idx="2">
-              <a:schemeClr val="dk1"/>
-            </a:lnRef>
-            <a:fillRef idx="0">
-              <a:schemeClr val="dk1"/>
-            </a:fillRef>
-            <a:effectRef idx="1">
-              <a:schemeClr val="dk1"/>
-            </a:effectRef>
-            <a:fontRef idx="minor">
-              <a:schemeClr val="tx1"/>
-            </a:fontRef>
-          </p:style>
-        </p:cxnSp>
-        <p:sp>
-          <p:nvSpPr>
             <p:cNvPr id="52" name="Oval 51">
               <a:extLst>
                 <a:ext uri="{FF2B5EF4-FFF2-40B4-BE49-F238E27FC236}">
@@ -6620,8 +5264,8 @@
             <p:nvPr/>
           </p:nvSpPr>
           <p:spPr>
-            <a:xfrm rot="18294376">
-              <a:off x="5693716" y="4389910"/>
+            <a:xfrm>
+              <a:off x="5650165" y="3763108"/>
               <a:ext cx="346671" cy="808723"/>
             </a:xfrm>
             <a:prstGeom prst="ellipse">
@@ -6673,99 +5317,6 @@
         </p:sp>
         <p:sp>
           <p:nvSpPr>
-            <p:cNvPr id="57" name="Oval 56">
-              <a:extLst>
-                <a:ext uri="{FF2B5EF4-FFF2-40B4-BE49-F238E27FC236}">
-                  <a16:creationId xmlns:a16="http://schemas.microsoft.com/office/drawing/2014/main" id="{30FE1409-7865-8710-384F-5B9D104D10C7}"/>
-                </a:ext>
-              </a:extLst>
-            </p:cNvPr>
-            <p:cNvSpPr/>
-            <p:nvPr/>
-          </p:nvSpPr>
-          <p:spPr>
-            <a:xfrm rot="18533770">
-              <a:off x="5116557" y="5834365"/>
-              <a:ext cx="64233" cy="157859"/>
-            </a:xfrm>
-            <a:prstGeom prst="ellipse">
-              <a:avLst/>
-            </a:prstGeom>
-            <a:solidFill>
-              <a:schemeClr val="tx1"/>
-            </a:solidFill>
-            <a:ln>
-              <a:solidFill>
-                <a:schemeClr val="tx1"/>
-              </a:solidFill>
-            </a:ln>
-          </p:spPr>
-          <p:style>
-            <a:lnRef idx="2">
-              <a:schemeClr val="accent1">
-                <a:shade val="15000"/>
-              </a:schemeClr>
-            </a:lnRef>
-            <a:fillRef idx="1">
-              <a:schemeClr val="accent1"/>
-            </a:fillRef>
-            <a:effectRef idx="0">
-              <a:schemeClr val="accent1"/>
-            </a:effectRef>
-            <a:fontRef idx="minor">
-              <a:schemeClr val="lt1"/>
-            </a:fontRef>
-          </p:style>
-          <p:txBody>
-            <a:bodyPr rtlCol="0" anchor="ctr"/>
-            <a:lstStyle/>
-            <a:p>
-              <a:pPr algn="ctr"/>
-              <a:endParaRPr lang="en-PH"/>
-            </a:p>
-          </p:txBody>
-        </p:sp>
-        <p:cxnSp>
-          <p:nvCxnSpPr>
-            <p:cNvPr id="184" name="Straight Connector 183">
-              <a:extLst>
-                <a:ext uri="{FF2B5EF4-FFF2-40B4-BE49-F238E27FC236}">
-                  <a16:creationId xmlns:a16="http://schemas.microsoft.com/office/drawing/2014/main" id="{5734ABC8-7EDD-6793-7120-D678824DB3F8}"/>
-                </a:ext>
-              </a:extLst>
-            </p:cNvPr>
-            <p:cNvCxnSpPr>
-              <a:cxnSpLocks/>
-            </p:cNvCxnSpPr>
-            <p:nvPr/>
-          </p:nvCxnSpPr>
-          <p:spPr>
-            <a:xfrm>
-              <a:off x="6503133" y="2900534"/>
-              <a:ext cx="315357" cy="193058"/>
-            </a:xfrm>
-            <a:prstGeom prst="line">
-              <a:avLst/>
-            </a:prstGeom>
-            <a:ln w="76200"/>
-          </p:spPr>
-          <p:style>
-            <a:lnRef idx="2">
-              <a:schemeClr val="dk1"/>
-            </a:lnRef>
-            <a:fillRef idx="0">
-              <a:schemeClr val="dk1"/>
-            </a:fillRef>
-            <a:effectRef idx="1">
-              <a:schemeClr val="dk1"/>
-            </a:effectRef>
-            <a:fontRef idx="minor">
-              <a:schemeClr val="tx1"/>
-            </a:fontRef>
-          </p:style>
-        </p:cxnSp>
-        <p:sp>
-          <p:nvSpPr>
             <p:cNvPr id="187" name="Isosceles Triangle 186">
               <a:extLst>
                 <a:ext uri="{FF2B5EF4-FFF2-40B4-BE49-F238E27FC236}">
@@ -6777,8 +5328,8 @@
             <p:nvPr/>
           </p:nvSpPr>
           <p:spPr>
-            <a:xfrm rot="1983322">
-              <a:off x="5589705" y="5124332"/>
+            <a:xfrm rot="5400000">
+              <a:off x="5308450" y="4088489"/>
               <a:ext cx="89810" cy="161689"/>
             </a:xfrm>
             <a:prstGeom prst="triangle">
@@ -6820,176 +5371,6 @@
             </a:p>
           </p:txBody>
         </p:sp>
-        <p:cxnSp>
-          <p:nvCxnSpPr>
-            <p:cNvPr id="188" name="Straight Connector 187">
-              <a:extLst>
-                <a:ext uri="{FF2B5EF4-FFF2-40B4-BE49-F238E27FC236}">
-                  <a16:creationId xmlns:a16="http://schemas.microsoft.com/office/drawing/2014/main" id="{6623DFD0-1EF2-EE0B-4820-667E2CB1D2A4}"/>
-                </a:ext>
-              </a:extLst>
-            </p:cNvPr>
-            <p:cNvCxnSpPr>
-              <a:cxnSpLocks/>
-              <a:stCxn id="57" idx="6"/>
-              <a:endCxn id="51" idx="2"/>
-            </p:cNvCxnSpPr>
-            <p:nvPr/>
-          </p:nvCxnSpPr>
-          <p:spPr>
-            <a:xfrm flipV="1">
-              <a:off x="5168840" y="5556078"/>
-              <a:ext cx="230581" cy="332221"/>
-            </a:xfrm>
-            <a:prstGeom prst="line">
-              <a:avLst/>
-            </a:prstGeom>
-            <a:ln w="57150">
-              <a:solidFill>
-                <a:srgbClr val="FF0000"/>
-              </a:solidFill>
-            </a:ln>
-          </p:spPr>
-          <p:style>
-            <a:lnRef idx="2">
-              <a:schemeClr val="accent1"/>
-            </a:lnRef>
-            <a:fillRef idx="0">
-              <a:schemeClr val="accent1"/>
-            </a:fillRef>
-            <a:effectRef idx="1">
-              <a:schemeClr val="accent1"/>
-            </a:effectRef>
-            <a:fontRef idx="minor">
-              <a:schemeClr val="tx1"/>
-            </a:fontRef>
-          </p:style>
-        </p:cxnSp>
-        <p:pic>
-          <p:nvPicPr>
-            <p:cNvPr id="211" name="Picture 210" descr="A screen with a graph on it&#10;&#10;Description automatically generated">
-              <a:extLst>
-                <a:ext uri="{FF2B5EF4-FFF2-40B4-BE49-F238E27FC236}">
-                  <a16:creationId xmlns:a16="http://schemas.microsoft.com/office/drawing/2014/main" id="{D56096F2-7DBC-CFA4-F5E1-1DC73879E417}"/>
-                </a:ext>
-              </a:extLst>
-            </p:cNvPr>
-            <p:cNvPicPr>
-              <a:picLocks noChangeAspect="1"/>
-            </p:cNvPicPr>
-            <p:nvPr/>
-          </p:nvPicPr>
-          <p:blipFill>
-            <a:blip r:embed="rId5">
-              <a:extLst>
-                <a:ext uri="{28A0092B-C50C-407E-A947-70E740481C1C}">
-                  <a14:useLocalDpi xmlns:a14="http://schemas.microsoft.com/office/drawing/2010/main" val="0"/>
-                </a:ext>
-                <a:ext uri="{837473B0-CC2E-450A-ABE3-18F120FF3D39}">
-                  <a1611:picAttrSrcUrl xmlns:a1611="http://schemas.microsoft.com/office/drawing/2016/11/main" r:id="rId6"/>
-                </a:ext>
-              </a:extLst>
-            </a:blip>
-            <a:stretch>
-              <a:fillRect/>
-            </a:stretch>
-          </p:blipFill>
-          <p:spPr>
-            <a:xfrm>
-              <a:off x="1912189" y="5369551"/>
-              <a:ext cx="1033491" cy="546889"/>
-            </a:xfrm>
-            <a:prstGeom prst="rect">
-              <a:avLst/>
-            </a:prstGeom>
-          </p:spPr>
-        </p:pic>
-        <mc:AlternateContent xmlns:mc="http://schemas.openxmlformats.org/markup-compatibility/2006">
-          <mc:Choice xmlns:p14="http://schemas.microsoft.com/office/powerpoint/2010/main" Requires="p14">
-            <p:contentPart p14:bwMode="auto" r:id="rId7">
-              <p14:nvContentPartPr>
-                <p14:cNvPr id="205" name="Ink 204">
-                  <a:extLst>
-                    <a:ext uri="{FF2B5EF4-FFF2-40B4-BE49-F238E27FC236}">
-                      <a16:creationId xmlns:a16="http://schemas.microsoft.com/office/drawing/2014/main" id="{498CB499-20C6-0E57-15BA-6B02BD309A41}"/>
-                    </a:ext>
-                  </a:extLst>
-                </p14:cNvPr>
-                <p14:cNvContentPartPr/>
-                <p14:nvPr/>
-              </p14:nvContentPartPr>
-              <p14:xfrm>
-                <a:off x="2821018" y="5697431"/>
-                <a:ext cx="982080" cy="98280"/>
-              </p14:xfrm>
-            </p:contentPart>
-          </mc:Choice>
-          <mc:Fallback>
-            <p:pic>
-              <p:nvPicPr>
-                <p:cNvPr id="205" name="Ink 204">
-                  <a:extLst>
-                    <a:ext uri="{FF2B5EF4-FFF2-40B4-BE49-F238E27FC236}">
-                      <a16:creationId xmlns:a16="http://schemas.microsoft.com/office/drawing/2014/main" id="{498CB499-20C6-0E57-15BA-6B02BD309A41}"/>
-                    </a:ext>
-                  </a:extLst>
-                </p:cNvPr>
-                <p:cNvPicPr/>
-                <p:nvPr/>
-              </p:nvPicPr>
-              <p:blipFill>
-                <a:blip r:embed="rId8"/>
-                <a:stretch>
-                  <a:fillRect/>
-                </a:stretch>
-              </p:blipFill>
-              <p:spPr>
-                <a:xfrm>
-                  <a:off x="2803018" y="5679431"/>
-                  <a:ext cx="1017720" cy="133920"/>
-                </a:xfrm>
-                <a:prstGeom prst="rect">
-                  <a:avLst/>
-                </a:prstGeom>
-              </p:spPr>
-            </p:pic>
-          </mc:Fallback>
-        </mc:AlternateContent>
-        <p:sp>
-          <p:nvSpPr>
-            <p:cNvPr id="213" name="TextBox 212">
-              <a:extLst>
-                <a:ext uri="{FF2B5EF4-FFF2-40B4-BE49-F238E27FC236}">
-                  <a16:creationId xmlns:a16="http://schemas.microsoft.com/office/drawing/2014/main" id="{C2C8DCC9-B7A5-B94A-920F-73C08EAF620F}"/>
-                </a:ext>
-              </a:extLst>
-            </p:cNvPr>
-            <p:cNvSpPr txBox="1"/>
-            <p:nvPr/>
-          </p:nvSpPr>
-          <p:spPr>
-            <a:xfrm>
-              <a:off x="4282789" y="6069138"/>
-              <a:ext cx="748088" cy="307777"/>
-            </a:xfrm>
-            <a:prstGeom prst="rect">
-              <a:avLst/>
-            </a:prstGeom>
-            <a:noFill/>
-          </p:spPr>
-          <p:txBody>
-            <a:bodyPr wrap="square" rtlCol="0">
-              <a:spAutoFit/>
-            </a:bodyPr>
-            <a:lstStyle/>
-            <a:p>
-              <a:r>
-                <a:rPr lang="en-PH" sz="1400" dirty="0"/>
-                <a:t>SMF</a:t>
-              </a:r>
-            </a:p>
-          </p:txBody>
-        </p:sp>
         <p:sp>
           <p:nvSpPr>
             <p:cNvPr id="51" name="Oval 50">
@@ -7003,8 +5384,8 @@
             <p:nvPr/>
           </p:nvSpPr>
           <p:spPr>
-            <a:xfrm rot="18230538">
-              <a:off x="5322617" y="5007748"/>
+            <a:xfrm>
+              <a:off x="4935072" y="3756262"/>
               <a:ext cx="346671" cy="808723"/>
             </a:xfrm>
             <a:prstGeom prst="ellipse">
@@ -7056,68 +5437,10 @@
         </p:sp>
         <p:sp>
           <p:nvSpPr>
-            <p:cNvPr id="59" name="Rectangle 58">
+            <p:cNvPr id="223" name="TextBox 222">
               <a:extLst>
                 <a:ext uri="{FF2B5EF4-FFF2-40B4-BE49-F238E27FC236}">
-                  <a16:creationId xmlns:a16="http://schemas.microsoft.com/office/drawing/2014/main" id="{811847AB-5069-2B81-856A-BCF7BFBB1814}"/>
-                </a:ext>
-              </a:extLst>
-            </p:cNvPr>
-            <p:cNvSpPr/>
-            <p:nvPr/>
-          </p:nvSpPr>
-          <p:spPr>
-            <a:xfrm>
-              <a:off x="3803098" y="5525257"/>
-              <a:ext cx="257902" cy="503583"/>
-            </a:xfrm>
-            <a:prstGeom prst="rect">
-              <a:avLst/>
-            </a:prstGeom>
-            <a:solidFill>
-              <a:schemeClr val="bg2">
-                <a:lumMod val="50000"/>
-              </a:schemeClr>
-            </a:solidFill>
-            <a:ln>
-              <a:solidFill>
-                <a:schemeClr val="bg2">
-                  <a:lumMod val="25000"/>
-                </a:schemeClr>
-              </a:solidFill>
-            </a:ln>
-          </p:spPr>
-          <p:style>
-            <a:lnRef idx="2">
-              <a:schemeClr val="accent1">
-                <a:shade val="15000"/>
-              </a:schemeClr>
-            </a:lnRef>
-            <a:fillRef idx="1">
-              <a:schemeClr val="accent1"/>
-            </a:fillRef>
-            <a:effectRef idx="0">
-              <a:schemeClr val="accent1"/>
-            </a:effectRef>
-            <a:fontRef idx="minor">
-              <a:schemeClr val="lt1"/>
-            </a:fontRef>
-          </p:style>
-          <p:txBody>
-            <a:bodyPr rtlCol="0" anchor="ctr"/>
-            <a:lstStyle/>
-            <a:p>
-              <a:pPr algn="ctr"/>
-              <a:endParaRPr lang="en-PH" dirty="0"/>
-            </a:p>
-          </p:txBody>
-        </p:sp>
-        <p:sp>
-          <p:nvSpPr>
-            <p:cNvPr id="218" name="TextBox 217">
-              <a:extLst>
-                <a:ext uri="{FF2B5EF4-FFF2-40B4-BE49-F238E27FC236}">
-                  <a16:creationId xmlns:a16="http://schemas.microsoft.com/office/drawing/2014/main" id="{D563B631-64B1-9CFE-71FB-FEC578F491B2}"/>
+                  <a16:creationId xmlns:a16="http://schemas.microsoft.com/office/drawing/2014/main" id="{A6075877-9FC9-D398-681B-B97D1CFA1CA1}"/>
                 </a:ext>
               </a:extLst>
             </p:cNvPr>
@@ -7126,8 +5449,8 @@
           </p:nvSpPr>
           <p:spPr>
             <a:xfrm>
-              <a:off x="3492835" y="295576"/>
-              <a:ext cx="1737435" cy="307777"/>
+              <a:off x="1257051" y="4391543"/>
+              <a:ext cx="1557978" cy="307777"/>
             </a:xfrm>
             <a:prstGeom prst="rect">
               <a:avLst/>
@@ -7141,50 +5464,6 @@
             <a:lstStyle/>
             <a:p>
               <a:pPr algn="ctr"/>
-              <a:r>
-                <a:rPr lang="en-US" sz="1400" dirty="0"/>
-                <a:t>(He-Ne, </a:t>
-              </a:r>
-              <a:r>
-                <a:rPr lang="el-GR" sz="1400" dirty="0"/>
-                <a:t>λ</a:t>
-              </a:r>
-              <a:r>
-                <a:rPr lang="en-US" sz="1400" dirty="0"/>
-                <a:t>=633 nm)</a:t>
-              </a:r>
-              <a:endParaRPr lang="en-PH" sz="1400" dirty="0"/>
-            </a:p>
-          </p:txBody>
-        </p:sp>
-        <p:sp>
-          <p:nvSpPr>
-            <p:cNvPr id="223" name="TextBox 222">
-              <a:extLst>
-                <a:ext uri="{FF2B5EF4-FFF2-40B4-BE49-F238E27FC236}">
-                  <a16:creationId xmlns:a16="http://schemas.microsoft.com/office/drawing/2014/main" id="{A6075877-9FC9-D398-681B-B97D1CFA1CA1}"/>
-                </a:ext>
-              </a:extLst>
-            </p:cNvPr>
-            <p:cNvSpPr txBox="1"/>
-            <p:nvPr/>
-          </p:nvSpPr>
-          <p:spPr>
-            <a:xfrm>
-              <a:off x="1684809" y="5901974"/>
-              <a:ext cx="1557978" cy="307777"/>
-            </a:xfrm>
-            <a:prstGeom prst="rect">
-              <a:avLst/>
-            </a:prstGeom>
-            <a:noFill/>
-          </p:spPr>
-          <p:txBody>
-            <a:bodyPr wrap="square" rtlCol="0">
-              <a:spAutoFit/>
-            </a:bodyPr>
-            <a:lstStyle/>
-            <a:p>
               <a:r>
                 <a:rPr lang="en-US" sz="1400" dirty="0"/>
                 <a:t>oscilloscope</a:t>
@@ -7207,7 +5486,7 @@
           </p:nvSpPr>
           <p:spPr>
             <a:xfrm>
-              <a:off x="3685147" y="5131393"/>
+              <a:off x="3054133" y="3509596"/>
               <a:ext cx="491788" cy="307777"/>
             </a:xfrm>
             <a:prstGeom prst="rect">
@@ -7230,103 +5509,34 @@
             </a:p>
           </p:txBody>
         </p:sp>
-        <p:sp>
-          <p:nvSpPr>
-            <p:cNvPr id="225" name="TextBox 224">
+        <p:cxnSp>
+          <p:nvCxnSpPr>
+            <p:cNvPr id="2" name="Straight Connector 1">
               <a:extLst>
                 <a:ext uri="{FF2B5EF4-FFF2-40B4-BE49-F238E27FC236}">
-                  <a16:creationId xmlns:a16="http://schemas.microsoft.com/office/drawing/2014/main" id="{51F32A7F-CED9-4766-F51D-E7B8FC3AD834}"/>
+                  <a16:creationId xmlns:a16="http://schemas.microsoft.com/office/drawing/2014/main" id="{370709A8-750C-2DEE-6E08-826B0F69B55C}"/>
                 </a:ext>
               </a:extLst>
             </p:cNvPr>
-            <p:cNvSpPr txBox="1"/>
+            <p:cNvCxnSpPr>
+              <a:cxnSpLocks/>
+              <a:stCxn id="17" idx="2"/>
+            </p:cNvCxnSpPr>
             <p:nvPr/>
-          </p:nvSpPr>
+          </p:nvCxnSpPr>
           <p:spPr>
             <a:xfrm>
-              <a:off x="6411188" y="2655670"/>
-              <a:ext cx="481352" cy="307777"/>
+              <a:off x="6926381" y="3188846"/>
+              <a:ext cx="1" cy="971778"/>
             </a:xfrm>
-            <a:prstGeom prst="rect">
+            <a:prstGeom prst="line">
               <a:avLst/>
             </a:prstGeom>
-            <a:noFill/>
-          </p:spPr>
-          <p:txBody>
-            <a:bodyPr wrap="square" rtlCol="0">
-              <a:spAutoFit/>
-            </a:bodyPr>
-            <a:lstStyle/>
-            <a:p>
-              <a:pPr algn="ctr"/>
-              <a:r>
-                <a:rPr lang="en-US" sz="1400" dirty="0"/>
-                <a:t>PH</a:t>
-              </a:r>
-              <a:endParaRPr lang="en-PH" sz="1400" dirty="0"/>
-            </a:p>
-          </p:txBody>
-        </p:sp>
-        <p:sp>
-          <p:nvSpPr>
-            <p:cNvPr id="229" name="TextBox 228">
-              <a:extLst>
-                <a:ext uri="{FF2B5EF4-FFF2-40B4-BE49-F238E27FC236}">
-                  <a16:creationId xmlns:a16="http://schemas.microsoft.com/office/drawing/2014/main" id="{A2543F1C-BD83-C676-2702-8E40F37FB6DD}"/>
-                </a:ext>
-              </a:extLst>
-            </p:cNvPr>
-            <p:cNvSpPr txBox="1"/>
-            <p:nvPr/>
-          </p:nvSpPr>
-          <p:spPr>
-            <a:xfrm>
-              <a:off x="3525850" y="1250127"/>
-              <a:ext cx="1568747" cy="307777"/>
-            </a:xfrm>
-            <a:prstGeom prst="rect">
-              <a:avLst/>
-            </a:prstGeom>
-            <a:noFill/>
-          </p:spPr>
-          <p:txBody>
-            <a:bodyPr wrap="square" rtlCol="0">
-              <a:spAutoFit/>
-            </a:bodyPr>
-            <a:lstStyle/>
-            <a:p>
-              <a:pPr algn="ctr"/>
-              <a:r>
-                <a:rPr lang="en-US" sz="1400" dirty="0"/>
-                <a:t>Beam expander</a:t>
-              </a:r>
-              <a:endParaRPr lang="en-PH" sz="1400" dirty="0"/>
-            </a:p>
-          </p:txBody>
-        </p:sp>
-        <p:sp>
-          <p:nvSpPr>
-            <p:cNvPr id="39" name="Left Brace 38">
-              <a:extLst>
-                <a:ext uri="{FF2B5EF4-FFF2-40B4-BE49-F238E27FC236}">
-                  <a16:creationId xmlns:a16="http://schemas.microsoft.com/office/drawing/2014/main" id="{B43CCE2E-24FF-F900-CCE9-AE07C9328280}"/>
-                </a:ext>
-              </a:extLst>
-            </p:cNvPr>
-            <p:cNvSpPr/>
-            <p:nvPr/>
-          </p:nvSpPr>
-          <p:spPr>
-            <a:xfrm rot="5400000">
-              <a:off x="4219304" y="1100501"/>
-              <a:ext cx="126970" cy="1108938"/>
-            </a:xfrm>
-            <a:prstGeom prst="leftBrace">
-              <a:avLst>
-                <a:gd name="adj1" fmla="val 8333"/>
-                <a:gd name="adj2" fmla="val 50916"/>
-              </a:avLst>
-            </a:prstGeom>
+            <a:ln w="57150">
+              <a:solidFill>
+                <a:srgbClr val="FF0000"/>
+              </a:solidFill>
+            </a:ln>
           </p:spPr>
           <p:style>
             <a:lnRef idx="2">
@@ -7342,21 +5552,58 @@
               <a:schemeClr val="tx1"/>
             </a:fontRef>
           </p:style>
-          <p:txBody>
-            <a:bodyPr rtlCol="0" anchor="ctr"/>
-            <a:lstStyle/>
-            <a:p>
-              <a:pPr algn="ctr"/>
-              <a:endParaRPr lang="en-PH"/>
-            </a:p>
-          </p:txBody>
-        </p:sp>
+        </p:cxnSp>
+        <p:cxnSp>
+          <p:nvCxnSpPr>
+            <p:cNvPr id="16" name="Straight Connector 15">
+              <a:extLst>
+                <a:ext uri="{FF2B5EF4-FFF2-40B4-BE49-F238E27FC236}">
+                  <a16:creationId xmlns:a16="http://schemas.microsoft.com/office/drawing/2014/main" id="{09399AB8-DA13-C8E2-0FCB-FFECBE3205DE}"/>
+                </a:ext>
+              </a:extLst>
+            </p:cNvPr>
+            <p:cNvCxnSpPr>
+              <a:cxnSpLocks/>
+              <a:stCxn id="18" idx="3"/>
+              <a:endCxn id="17" idx="2"/>
+            </p:cNvCxnSpPr>
+            <p:nvPr/>
+          </p:nvCxnSpPr>
+          <p:spPr>
+            <a:xfrm rot="3415600" flipV="1">
+              <a:off x="6032910" y="2704471"/>
+              <a:ext cx="632412" cy="965922"/>
+            </a:xfrm>
+            <a:prstGeom prst="line">
+              <a:avLst/>
+            </a:prstGeom>
+            <a:ln w="57150">
+              <a:solidFill>
+                <a:srgbClr val="FF0000"/>
+              </a:solidFill>
+            </a:ln>
+          </p:spPr>
+          <p:style>
+            <a:lnRef idx="2">
+              <a:schemeClr val="accent1"/>
+            </a:lnRef>
+            <a:fillRef idx="0">
+              <a:schemeClr val="accent1"/>
+            </a:fillRef>
+            <a:effectRef idx="1">
+              <a:schemeClr val="accent1"/>
+            </a:effectRef>
+            <a:fontRef idx="minor">
+              <a:schemeClr val="tx1"/>
+            </a:fontRef>
+          </p:style>
+        </p:cxnSp>
         <p:sp>
           <p:nvSpPr>
-            <p:cNvPr id="8" name="Rectangle 7">
+            <p:cNvPr id="17" name="Rectangle 16">
               <a:extLst>
                 <a:ext uri="{FF2B5EF4-FFF2-40B4-BE49-F238E27FC236}">
-                  <a16:creationId xmlns:a16="http://schemas.microsoft.com/office/drawing/2014/main" id="{BEC40115-50D6-B8FE-6245-040DE37A019E}"/>
+                  <a16:creationId xmlns:a16="http://schemas.microsoft.com/office/drawing/2014/main" id="{ACA4F535-723E-3F60-D099-1EC9ABC1507F}"/>
                 </a:ext>
               </a:extLst>
             </p:cNvPr>
@@ -7364,8 +5611,8 @@
             <p:nvPr/>
           </p:nvSpPr>
           <p:spPr>
-            <a:xfrm rot="1359346">
-              <a:off x="1825413" y="2195347"/>
+            <a:xfrm rot="2705307">
+              <a:off x="6703986" y="3024166"/>
               <a:ext cx="581513" cy="193058"/>
             </a:xfrm>
             <a:prstGeom prst="rect">
@@ -7415,10 +5662,10 @@
         </p:sp>
         <p:sp>
           <p:nvSpPr>
-            <p:cNvPr id="9" name="Rectangle 8">
+            <p:cNvPr id="18" name="Rectangle: Rounded Corners 17">
               <a:extLst>
                 <a:ext uri="{FF2B5EF4-FFF2-40B4-BE49-F238E27FC236}">
-                  <a16:creationId xmlns:a16="http://schemas.microsoft.com/office/drawing/2014/main" id="{37E532B5-C561-1ECF-E3BE-97ACEFC9541B}"/>
+                  <a16:creationId xmlns:a16="http://schemas.microsoft.com/office/drawing/2014/main" id="{AAB2580D-041C-D57C-5782-FAC6E17C28C9}"/>
                 </a:ext>
               </a:extLst>
             </p:cNvPr>
@@ -7426,8 +5673,198 @@
             <p:nvPr/>
           </p:nvSpPr>
           <p:spPr>
-            <a:xfrm rot="19515393">
-              <a:off x="1823447" y="600008"/>
+            <a:xfrm rot="43105">
+              <a:off x="4910281" y="2936718"/>
+              <a:ext cx="861603" cy="487796"/>
+            </a:xfrm>
+            <a:prstGeom prst="roundRect">
+              <a:avLst/>
+            </a:prstGeom>
+            <a:solidFill>
+              <a:schemeClr val="bg2">
+                <a:lumMod val="25000"/>
+              </a:schemeClr>
+            </a:solidFill>
+          </p:spPr>
+          <p:style>
+            <a:lnRef idx="2">
+              <a:schemeClr val="accent1">
+                <a:shade val="15000"/>
+              </a:schemeClr>
+            </a:lnRef>
+            <a:fillRef idx="1">
+              <a:schemeClr val="accent1"/>
+            </a:fillRef>
+            <a:effectRef idx="0">
+              <a:schemeClr val="accent1"/>
+            </a:effectRef>
+            <a:fontRef idx="minor">
+              <a:schemeClr val="lt1"/>
+            </a:fontRef>
+          </p:style>
+          <p:txBody>
+            <a:bodyPr rtlCol="0" anchor="ctr"/>
+            <a:lstStyle/>
+            <a:p>
+              <a:pPr algn="ctr"/>
+              <a:r>
+                <a:rPr lang="en-US" sz="1400" dirty="0"/>
+                <a:t>camera</a:t>
+              </a:r>
+              <a:endParaRPr lang="en-PH" sz="1400" dirty="0"/>
+            </a:p>
+          </p:txBody>
+        </p:sp>
+        <p:pic>
+          <p:nvPicPr>
+            <p:cNvPr id="21" name="Picture 20" descr="A black and white gradient&#10;&#10;Description automatically generated">
+              <a:extLst>
+                <a:ext uri="{FF2B5EF4-FFF2-40B4-BE49-F238E27FC236}">
+                  <a16:creationId xmlns:a16="http://schemas.microsoft.com/office/drawing/2014/main" id="{06856B3E-55B6-7EB6-40B0-291420BE15A8}"/>
+                </a:ext>
+              </a:extLst>
+            </p:cNvPr>
+            <p:cNvPicPr>
+              <a:picLocks noChangeAspect="1"/>
+            </p:cNvPicPr>
+            <p:nvPr/>
+          </p:nvPicPr>
+          <p:blipFill>
+            <a:blip r:embed="rId7">
+              <a:extLst>
+                <a:ext uri="{28A0092B-C50C-407E-A947-70E740481C1C}">
+                  <a14:useLocalDpi xmlns:a14="http://schemas.microsoft.com/office/drawing/2010/main" val="0"/>
+                </a:ext>
+              </a:extLst>
+            </a:blip>
+            <a:stretch>
+              <a:fillRect/>
+            </a:stretch>
+          </p:blipFill>
+          <p:spPr>
+            <a:xfrm>
+              <a:off x="9327700" y="1655088"/>
+              <a:ext cx="483832" cy="483832"/>
+            </a:xfrm>
+            <a:prstGeom prst="rect">
+              <a:avLst/>
+            </a:prstGeom>
+          </p:spPr>
+        </p:pic>
+        <p:sp>
+          <p:nvSpPr>
+            <p:cNvPr id="22" name="Arrow: U-Turn 21">
+              <a:extLst>
+                <a:ext uri="{FF2B5EF4-FFF2-40B4-BE49-F238E27FC236}">
+                  <a16:creationId xmlns:a16="http://schemas.microsoft.com/office/drawing/2014/main" id="{F4F7494F-AF7D-BE0B-0595-E26D7CE73C81}"/>
+                </a:ext>
+              </a:extLst>
+            </p:cNvPr>
+            <p:cNvSpPr/>
+            <p:nvPr/>
+          </p:nvSpPr>
+          <p:spPr>
+            <a:xfrm flipH="1">
+              <a:off x="8716490" y="1219818"/>
+              <a:ext cx="844160" cy="369795"/>
+            </a:xfrm>
+            <a:prstGeom prst="uturnArrow">
+              <a:avLst>
+                <a:gd name="adj1" fmla="val 10544"/>
+                <a:gd name="adj2" fmla="val 25000"/>
+                <a:gd name="adj3" fmla="val 25000"/>
+                <a:gd name="adj4" fmla="val 43750"/>
+                <a:gd name="adj5" fmla="val 100000"/>
+              </a:avLst>
+            </a:prstGeom>
+          </p:spPr>
+          <p:style>
+            <a:lnRef idx="2">
+              <a:schemeClr val="accent1">
+                <a:shade val="15000"/>
+              </a:schemeClr>
+            </a:lnRef>
+            <a:fillRef idx="1">
+              <a:schemeClr val="accent1"/>
+            </a:fillRef>
+            <a:effectRef idx="0">
+              <a:schemeClr val="accent1"/>
+            </a:effectRef>
+            <a:fontRef idx="minor">
+              <a:schemeClr val="lt1"/>
+            </a:fontRef>
+          </p:style>
+          <p:txBody>
+            <a:bodyPr rtlCol="0" anchor="ctr"/>
+            <a:lstStyle/>
+            <a:p>
+              <a:pPr algn="ctr"/>
+              <a:endParaRPr lang="en-PH" dirty="0">
+                <a:solidFill>
+                  <a:schemeClr val="tx1"/>
+                </a:solidFill>
+              </a:endParaRPr>
+            </a:p>
+          </p:txBody>
+        </p:sp>
+        <p:cxnSp>
+          <p:nvCxnSpPr>
+            <p:cNvPr id="27" name="Straight Connector 26">
+              <a:extLst>
+                <a:ext uri="{FF2B5EF4-FFF2-40B4-BE49-F238E27FC236}">
+                  <a16:creationId xmlns:a16="http://schemas.microsoft.com/office/drawing/2014/main" id="{2377FE5C-6FC0-DF33-313D-E33B9A3C205E}"/>
+                </a:ext>
+              </a:extLst>
+            </p:cNvPr>
+            <p:cNvCxnSpPr>
+              <a:cxnSpLocks/>
+            </p:cNvCxnSpPr>
+            <p:nvPr/>
+          </p:nvCxnSpPr>
+          <p:spPr>
+            <a:xfrm>
+              <a:off x="5991577" y="4150429"/>
+              <a:ext cx="1714750" cy="0"/>
+            </a:xfrm>
+            <a:prstGeom prst="line">
+              <a:avLst/>
+            </a:prstGeom>
+            <a:ln w="57150">
+              <a:solidFill>
+                <a:srgbClr val="FF0000"/>
+              </a:solidFill>
+            </a:ln>
+          </p:spPr>
+          <p:style>
+            <a:lnRef idx="2">
+              <a:schemeClr val="accent1"/>
+            </a:lnRef>
+            <a:fillRef idx="0">
+              <a:schemeClr val="accent1"/>
+            </a:fillRef>
+            <a:effectRef idx="1">
+              <a:schemeClr val="accent1"/>
+            </a:effectRef>
+            <a:fontRef idx="minor">
+              <a:schemeClr val="tx1"/>
+            </a:fontRef>
+          </p:style>
+        </p:cxnSp>
+        <p:sp>
+          <p:nvSpPr>
+            <p:cNvPr id="8" name="Rectangle 7">
+              <a:extLst>
+                <a:ext uri="{FF2B5EF4-FFF2-40B4-BE49-F238E27FC236}">
+                  <a16:creationId xmlns:a16="http://schemas.microsoft.com/office/drawing/2014/main" id="{BEC40115-50D6-B8FE-6245-040DE37A019E}"/>
+                </a:ext>
+              </a:extLst>
+            </p:cNvPr>
+            <p:cNvSpPr/>
+            <p:nvPr/>
+          </p:nvSpPr>
+          <p:spPr>
+            <a:xfrm rot="1359346">
+              <a:off x="3160067" y="2288101"/>
               <a:ext cx="581513" cy="193058"/>
             </a:xfrm>
             <a:prstGeom prst="rect">
@@ -7475,140 +5912,6 @@
             </a:p>
           </p:txBody>
         </p:sp>
-        <p:cxnSp>
-          <p:nvCxnSpPr>
-            <p:cNvPr id="13" name="Straight Connector 12">
-              <a:extLst>
-                <a:ext uri="{FF2B5EF4-FFF2-40B4-BE49-F238E27FC236}">
-                  <a16:creationId xmlns:a16="http://schemas.microsoft.com/office/drawing/2014/main" id="{68602822-A5C0-B530-358C-0FF51A775D75}"/>
-                </a:ext>
-              </a:extLst>
-            </p:cNvPr>
-            <p:cNvCxnSpPr>
-              <a:cxnSpLocks/>
-              <a:stCxn id="8" idx="0"/>
-              <a:endCxn id="9" idx="2"/>
-            </p:cNvCxnSpPr>
-            <p:nvPr/>
-          </p:nvCxnSpPr>
-          <p:spPr>
-            <a:xfrm flipV="1">
-              <a:off x="2153352" y="775856"/>
-              <a:ext cx="15864" cy="1426940"/>
-            </a:xfrm>
-            <a:prstGeom prst="line">
-              <a:avLst/>
-            </a:prstGeom>
-            <a:ln w="57150">
-              <a:solidFill>
-                <a:srgbClr val="FF0000"/>
-              </a:solidFill>
-            </a:ln>
-          </p:spPr>
-          <p:style>
-            <a:lnRef idx="2">
-              <a:schemeClr val="accent1"/>
-            </a:lnRef>
-            <a:fillRef idx="0">
-              <a:schemeClr val="accent1"/>
-            </a:fillRef>
-            <a:effectRef idx="1">
-              <a:schemeClr val="accent1"/>
-            </a:effectRef>
-            <a:fontRef idx="minor">
-              <a:schemeClr val="tx1"/>
-            </a:fontRef>
-          </p:style>
-        </p:cxnSp>
-        <p:cxnSp>
-          <p:nvCxnSpPr>
-            <p:cNvPr id="15" name="Straight Connector 14">
-              <a:extLst>
-                <a:ext uri="{FF2B5EF4-FFF2-40B4-BE49-F238E27FC236}">
-                  <a16:creationId xmlns:a16="http://schemas.microsoft.com/office/drawing/2014/main" id="{C70E1DA9-9084-D47D-96CB-C5B33E09ED3F}"/>
-                </a:ext>
-              </a:extLst>
-            </p:cNvPr>
-            <p:cNvCxnSpPr>
-              <a:cxnSpLocks/>
-              <a:stCxn id="6" idx="2"/>
-              <a:endCxn id="8" idx="0"/>
-            </p:cNvCxnSpPr>
-            <p:nvPr/>
-          </p:nvCxnSpPr>
-          <p:spPr>
-            <a:xfrm flipH="1">
-              <a:off x="2153352" y="2201492"/>
-              <a:ext cx="1417749" cy="1304"/>
-            </a:xfrm>
-            <a:prstGeom prst="line">
-              <a:avLst/>
-            </a:prstGeom>
-            <a:ln w="57150">
-              <a:solidFill>
-                <a:srgbClr val="FF0000"/>
-              </a:solidFill>
-            </a:ln>
-          </p:spPr>
-          <p:style>
-            <a:lnRef idx="2">
-              <a:schemeClr val="accent1"/>
-            </a:lnRef>
-            <a:fillRef idx="0">
-              <a:schemeClr val="accent1"/>
-            </a:fillRef>
-            <a:effectRef idx="1">
-              <a:schemeClr val="accent1"/>
-            </a:effectRef>
-            <a:fontRef idx="minor">
-              <a:schemeClr val="tx1"/>
-            </a:fontRef>
-          </p:style>
-        </p:cxnSp>
-        <p:cxnSp>
-          <p:nvCxnSpPr>
-            <p:cNvPr id="2" name="Straight Connector 1">
-              <a:extLst>
-                <a:ext uri="{FF2B5EF4-FFF2-40B4-BE49-F238E27FC236}">
-                  <a16:creationId xmlns:a16="http://schemas.microsoft.com/office/drawing/2014/main" id="{370709A8-750C-2DEE-6E08-826B0F69B55C}"/>
-                </a:ext>
-              </a:extLst>
-            </p:cNvPr>
-            <p:cNvCxnSpPr>
-              <a:cxnSpLocks/>
-              <a:stCxn id="17" idx="2"/>
-            </p:cNvCxnSpPr>
-            <p:nvPr/>
-          </p:nvCxnSpPr>
-          <p:spPr>
-            <a:xfrm>
-              <a:off x="5600971" y="3042473"/>
-              <a:ext cx="985908" cy="612408"/>
-            </a:xfrm>
-            <a:prstGeom prst="line">
-              <a:avLst/>
-            </a:prstGeom>
-            <a:ln w="57150">
-              <a:solidFill>
-                <a:srgbClr val="FF0000"/>
-              </a:solidFill>
-            </a:ln>
-          </p:spPr>
-          <p:style>
-            <a:lnRef idx="2">
-              <a:schemeClr val="accent1"/>
-            </a:lnRef>
-            <a:fillRef idx="0">
-              <a:schemeClr val="accent1"/>
-            </a:fillRef>
-            <a:effectRef idx="1">
-              <a:schemeClr val="accent1"/>
-            </a:effectRef>
-            <a:fontRef idx="minor">
-              <a:schemeClr val="tx1"/>
-            </a:fontRef>
-          </p:style>
-        </p:cxnSp>
         <p:grpSp>
           <p:nvGrpSpPr>
             <p:cNvPr id="3" name="Group 2">
@@ -7622,8 +5925,8 @@
             <p:nvPr/>
           </p:nvGrpSpPr>
           <p:grpSpPr>
-            <a:xfrm rot="18140460">
-              <a:off x="6361846" y="3456974"/>
+            <a:xfrm rot="16200000">
+              <a:off x="6743075" y="3933728"/>
               <a:ext cx="402385" cy="390824"/>
               <a:chOff x="3065276" y="2694209"/>
               <a:chExt cx="491789" cy="390824"/>
@@ -7729,92 +6032,10 @@
         </p:grpSp>
         <p:sp>
           <p:nvSpPr>
-            <p:cNvPr id="12" name="TextBox 11">
+            <p:cNvPr id="23" name="Rectangle 22">
               <a:extLst>
                 <a:ext uri="{FF2B5EF4-FFF2-40B4-BE49-F238E27FC236}">
-                  <a16:creationId xmlns:a16="http://schemas.microsoft.com/office/drawing/2014/main" id="{0B264088-ACA5-7BB5-34BA-8694BA59106B}"/>
-                </a:ext>
-              </a:extLst>
-            </p:cNvPr>
-            <p:cNvSpPr txBox="1"/>
-            <p:nvPr/>
-          </p:nvSpPr>
-          <p:spPr>
-            <a:xfrm>
-              <a:off x="6678804" y="3744205"/>
-              <a:ext cx="481352" cy="307777"/>
-            </a:xfrm>
-            <a:prstGeom prst="rect">
-              <a:avLst/>
-            </a:prstGeom>
-            <a:noFill/>
-          </p:spPr>
-          <p:txBody>
-            <a:bodyPr wrap="square" rtlCol="0">
-              <a:spAutoFit/>
-            </a:bodyPr>
-            <a:lstStyle/>
-            <a:p>
-              <a:pPr algn="ctr"/>
-              <a:r>
-                <a:rPr lang="en-US" sz="1400" dirty="0"/>
-                <a:t>BS</a:t>
-              </a:r>
-              <a:endParaRPr lang="en-PH" sz="1400" dirty="0"/>
-            </a:p>
-          </p:txBody>
-        </p:sp>
-        <p:cxnSp>
-          <p:nvCxnSpPr>
-            <p:cNvPr id="16" name="Straight Connector 15">
-              <a:extLst>
-                <a:ext uri="{FF2B5EF4-FFF2-40B4-BE49-F238E27FC236}">
-                  <a16:creationId xmlns:a16="http://schemas.microsoft.com/office/drawing/2014/main" id="{09399AB8-DA13-C8E2-0FCB-FFECBE3205DE}"/>
-                </a:ext>
-              </a:extLst>
-            </p:cNvPr>
-            <p:cNvCxnSpPr>
-              <a:cxnSpLocks/>
-              <a:stCxn id="18" idx="3"/>
-              <a:endCxn id="17" idx="2"/>
-            </p:cNvCxnSpPr>
-            <p:nvPr/>
-          </p:nvCxnSpPr>
-          <p:spPr>
-            <a:xfrm flipV="1">
-              <a:off x="4968559" y="3042473"/>
-              <a:ext cx="632412" cy="965922"/>
-            </a:xfrm>
-            <a:prstGeom prst="line">
-              <a:avLst/>
-            </a:prstGeom>
-            <a:ln w="57150">
-              <a:solidFill>
-                <a:srgbClr val="FF0000"/>
-              </a:solidFill>
-            </a:ln>
-          </p:spPr>
-          <p:style>
-            <a:lnRef idx="2">
-              <a:schemeClr val="accent1"/>
-            </a:lnRef>
-            <a:fillRef idx="0">
-              <a:schemeClr val="accent1"/>
-            </a:fillRef>
-            <a:effectRef idx="1">
-              <a:schemeClr val="accent1"/>
-            </a:effectRef>
-            <a:fontRef idx="minor">
-              <a:schemeClr val="tx1"/>
-            </a:fontRef>
-          </p:style>
-        </p:cxnSp>
-        <p:sp>
-          <p:nvSpPr>
-            <p:cNvPr id="17" name="Rectangle 16">
-              <a:extLst>
-                <a:ext uri="{FF2B5EF4-FFF2-40B4-BE49-F238E27FC236}">
-                  <a16:creationId xmlns:a16="http://schemas.microsoft.com/office/drawing/2014/main" id="{ACA4F535-723E-3F60-D099-1EC9ABC1507F}"/>
+                  <a16:creationId xmlns:a16="http://schemas.microsoft.com/office/drawing/2014/main" id="{79F3CDEB-A3D9-9845-C5A8-E9EBDD2475B8}"/>
                 </a:ext>
               </a:extLst>
             </p:cNvPr>
@@ -7822,8 +6043,8 @@
             <p:nvPr/>
           </p:nvSpPr>
           <p:spPr>
-            <a:xfrm rot="20889707">
-              <a:off x="5290411" y="2851468"/>
+            <a:xfrm rot="20163581">
+              <a:off x="7415573" y="4146597"/>
               <a:ext cx="581513" cy="193058"/>
             </a:xfrm>
             <a:prstGeom prst="rect">
@@ -7871,12 +6092,108 @@
             </a:p>
           </p:txBody>
         </p:sp>
+        <p:cxnSp>
+          <p:nvCxnSpPr>
+            <p:cNvPr id="40" name="Straight Connector 39">
+              <a:extLst>
+                <a:ext uri="{FF2B5EF4-FFF2-40B4-BE49-F238E27FC236}">
+                  <a16:creationId xmlns:a16="http://schemas.microsoft.com/office/drawing/2014/main" id="{F33089F0-D744-9445-BB68-DC3E38B4D2F5}"/>
+                </a:ext>
+              </a:extLst>
+            </p:cNvPr>
+            <p:cNvCxnSpPr>
+              <a:cxnSpLocks/>
+              <a:stCxn id="57" idx="6"/>
+              <a:endCxn id="51" idx="2"/>
+            </p:cNvCxnSpPr>
+            <p:nvPr/>
+          </p:nvCxnSpPr>
+          <p:spPr>
+            <a:xfrm flipV="1">
+              <a:off x="4566341" y="4160624"/>
+              <a:ext cx="368731" cy="2046"/>
+            </a:xfrm>
+            <a:prstGeom prst="line">
+              <a:avLst/>
+            </a:prstGeom>
+            <a:ln w="57150">
+              <a:solidFill>
+                <a:srgbClr val="FF0000"/>
+              </a:solidFill>
+            </a:ln>
+          </p:spPr>
+          <p:style>
+            <a:lnRef idx="2">
+              <a:schemeClr val="accent1"/>
+            </a:lnRef>
+            <a:fillRef idx="0">
+              <a:schemeClr val="accent1"/>
+            </a:fillRef>
+            <a:effectRef idx="1">
+              <a:schemeClr val="accent1"/>
+            </a:effectRef>
+            <a:fontRef idx="minor">
+              <a:schemeClr val="tx1"/>
+            </a:fontRef>
+          </p:style>
+        </p:cxnSp>
+        <mc:AlternateContent xmlns:mc="http://schemas.openxmlformats.org/markup-compatibility/2006">
+          <mc:Choice xmlns:p14="http://schemas.microsoft.com/office/powerpoint/2010/main" Requires="p14">
+            <p:contentPart p14:bwMode="auto" r:id="rId8">
+              <p14:nvContentPartPr>
+                <p14:cNvPr id="53" name="Ink 52">
+                  <a:extLst>
+                    <a:ext uri="{FF2B5EF4-FFF2-40B4-BE49-F238E27FC236}">
+                      <a16:creationId xmlns:a16="http://schemas.microsoft.com/office/drawing/2014/main" id="{8C7F5F78-42E2-913F-76A3-23865FDB2F53}"/>
+                    </a:ext>
+                  </a:extLst>
+                </p14:cNvPr>
+                <p14:cNvContentPartPr/>
+                <p14:nvPr/>
+              </p14:nvContentPartPr>
+              <p14:xfrm>
+                <a:off x="2409586" y="4152431"/>
+                <a:ext cx="753120" cy="109800"/>
+              </p14:xfrm>
+            </p:contentPart>
+          </mc:Choice>
+          <mc:Fallback>
+            <p:pic>
+              <p:nvPicPr>
+                <p:cNvPr id="53" name="Ink 52">
+                  <a:extLst>
+                    <a:ext uri="{FF2B5EF4-FFF2-40B4-BE49-F238E27FC236}">
+                      <a16:creationId xmlns:a16="http://schemas.microsoft.com/office/drawing/2014/main" id="{8C7F5F78-42E2-913F-76A3-23865FDB2F53}"/>
+                    </a:ext>
+                  </a:extLst>
+                </p:cNvPr>
+                <p:cNvPicPr/>
+                <p:nvPr/>
+              </p:nvPicPr>
+              <p:blipFill>
+                <a:blip r:embed="rId9"/>
+                <a:stretch>
+                  <a:fillRect/>
+                </a:stretch>
+              </p:blipFill>
+              <p:spPr>
+                <a:xfrm>
+                  <a:off x="2391946" y="4134791"/>
+                  <a:ext cx="788760" cy="145440"/>
+                </a:xfrm>
+                <a:prstGeom prst="rect">
+                  <a:avLst/>
+                </a:prstGeom>
+              </p:spPr>
+            </p:pic>
+          </mc:Fallback>
+        </mc:AlternateContent>
         <p:sp>
           <p:nvSpPr>
-            <p:cNvPr id="18" name="Rectangle: Rounded Corners 17">
+            <p:cNvPr id="59" name="Rectangle 58">
               <a:extLst>
                 <a:ext uri="{FF2B5EF4-FFF2-40B4-BE49-F238E27FC236}">
-                  <a16:creationId xmlns:a16="http://schemas.microsoft.com/office/drawing/2014/main" id="{AAB2580D-041C-D57C-5782-FAC6E17C28C9}"/>
+                  <a16:creationId xmlns:a16="http://schemas.microsoft.com/office/drawing/2014/main" id="{811847AB-5069-2B81-856A-BCF7BFBB1814}"/>
                 </a:ext>
               </a:extLst>
             </p:cNvPr>
@@ -7884,18 +6201,25 @@
             <p:nvPr/>
           </p:nvSpPr>
           <p:spPr>
-            <a:xfrm rot="18227505">
-              <a:off x="4298156" y="4122521"/>
-              <a:ext cx="861603" cy="487796"/>
+            <a:xfrm>
+              <a:off x="3172084" y="3903460"/>
+              <a:ext cx="257902" cy="503583"/>
             </a:xfrm>
-            <a:prstGeom prst="roundRect">
+            <a:prstGeom prst="rect">
               <a:avLst/>
             </a:prstGeom>
             <a:solidFill>
               <a:schemeClr val="bg2">
-                <a:lumMod val="25000"/>
+                <a:lumMod val="50000"/>
               </a:schemeClr>
             </a:solidFill>
+            <a:ln>
+              <a:solidFill>
+                <a:schemeClr val="bg2">
+                  <a:lumMod val="25000"/>
+                </a:schemeClr>
+              </a:solidFill>
+            </a:ln>
           </p:spPr>
           <p:style>
             <a:lnRef idx="2">
@@ -7918,11 +6242,7 @@
             <a:lstStyle/>
             <a:p>
               <a:pPr algn="ctr"/>
-              <a:r>
-                <a:rPr lang="en-US" sz="1400" dirty="0"/>
-                <a:t>camera</a:t>
-              </a:r>
-              <a:endParaRPr lang="en-PH" sz="1400" dirty="0"/>
+              <a:endParaRPr lang="en-PH" dirty="0"/>
             </a:p>
           </p:txBody>
         </p:sp>
@@ -7940,7 +6260,7 @@
 </p:sld>
 </file>
 
-<file path=ppt/slides/slide3.xml><?xml version="1.0" encoding="utf-8"?>
+<file path=ppt/slides/slide2.xml><?xml version="1.0" encoding="utf-8"?>
 <p:sld xmlns:a="http://schemas.openxmlformats.org/drawingml/2006/main" xmlns:r="http://schemas.openxmlformats.org/officeDocument/2006/relationships" xmlns:p="http://schemas.openxmlformats.org/presentationml/2006/main">
   <p:cSld>
     <p:spTree>

</xml_diff>